<commit_message>
Add examples of languages that support atomic
</commit_message>
<xml_diff>
--- a/p4_concurrency.pptx
+++ b/p4_concurrency.pptx
@@ -4081,7 +4081,7 @@
         <p:spPr/>
         <p:txBody>
           <a:bodyPr>
-            <a:normAutofit/>
+            <a:normAutofit fontScale="92500"/>
           </a:bodyPr>
           <a:lstStyle/>
           <a:p>
@@ -4136,8 +4136,34 @@
           <a:p>
             <a:r>
               <a:rPr lang="en-US" dirty="0" smtClean="0"/>
-              <a:t>Some precedent: transactional memory</a:t>
-            </a:r>
+              <a:t>Some </a:t>
+            </a:r>
+            <a:r>
+              <a:rPr lang="en-US" dirty="0" smtClean="0"/>
+              <a:t>precedent:</a:t>
+            </a:r>
+          </a:p>
+          <a:p>
+            <a:pPr lvl="1"/>
+            <a:r>
+              <a:rPr lang="en-US" dirty="0" smtClean="0"/>
+              <a:t>C++ (_transaction)</a:t>
+            </a:r>
+          </a:p>
+          <a:p>
+            <a:pPr lvl="1"/>
+            <a:r>
+              <a:rPr lang="en-US" dirty="0" smtClean="0"/>
+              <a:t>Haskell </a:t>
+            </a:r>
+            <a:r>
+              <a:rPr lang="en-US" smtClean="0"/>
+              <a:t>(atomic)</a:t>
+            </a:r>
+            <a:endParaRPr lang="en-US" smtClean="0"/>
+          </a:p>
+          <a:p>
+            <a:pPr lvl="1"/>
             <a:endParaRPr lang="en-US" dirty="0"/>
           </a:p>
         </p:txBody>

</xml_diff>

<commit_message>
Some updates based on new TM refs
</commit_message>
<xml_diff>
--- a/p4_concurrency.pptx
+++ b/p4_concurrency.pptx
@@ -11,10 +11,11 @@
     <p:sldId id="259" r:id="rId5"/>
     <p:sldId id="260" r:id="rId6"/>
     <p:sldId id="263" r:id="rId7"/>
-    <p:sldId id="261" r:id="rId8"/>
-    <p:sldId id="262" r:id="rId9"/>
-    <p:sldId id="265" r:id="rId10"/>
-    <p:sldId id="264" r:id="rId11"/>
+    <p:sldId id="266" r:id="rId8"/>
+    <p:sldId id="261" r:id="rId9"/>
+    <p:sldId id="262" r:id="rId10"/>
+    <p:sldId id="265" r:id="rId11"/>
+    <p:sldId id="264" r:id="rId12"/>
   </p:sldIdLst>
   <p:sldSz cx="12192000" cy="6858000"/>
   <p:notesSz cx="6858000" cy="9144000"/>
@@ -262,7 +263,7 @@
           <a:p>
             <a:fld id="{4D8523F5-3159-EA45-A3E0-FA7A05C4AA6A}" type="datetimeFigureOut">
               <a:rPr lang="en-US" smtClean="0"/>
-              <a:t>9/20/16</a:t>
+              <a:t>9/21/16</a:t>
             </a:fld>
             <a:endParaRPr lang="en-US"/>
           </a:p>
@@ -432,7 +433,7 @@
           <a:p>
             <a:fld id="{4D8523F5-3159-EA45-A3E0-FA7A05C4AA6A}" type="datetimeFigureOut">
               <a:rPr lang="en-US" smtClean="0"/>
-              <a:t>9/20/16</a:t>
+              <a:t>9/21/16</a:t>
             </a:fld>
             <a:endParaRPr lang="en-US"/>
           </a:p>
@@ -612,7 +613,7 @@
           <a:p>
             <a:fld id="{4D8523F5-3159-EA45-A3E0-FA7A05C4AA6A}" type="datetimeFigureOut">
               <a:rPr lang="en-US" smtClean="0"/>
-              <a:t>9/20/16</a:t>
+              <a:t>9/21/16</a:t>
             </a:fld>
             <a:endParaRPr lang="en-US"/>
           </a:p>
@@ -826,7 +827,7 @@
           <a:p>
             <a:fld id="{4D8523F5-3159-EA45-A3E0-FA7A05C4AA6A}" type="datetimeFigureOut">
               <a:rPr lang="en-US" smtClean="0"/>
-              <a:t>9/20/16</a:t>
+              <a:t>9/21/16</a:t>
             </a:fld>
             <a:endParaRPr lang="en-US"/>
           </a:p>
@@ -1072,7 +1073,7 @@
           <a:p>
             <a:fld id="{4D8523F5-3159-EA45-A3E0-FA7A05C4AA6A}" type="datetimeFigureOut">
               <a:rPr lang="en-US" smtClean="0"/>
-              <a:t>9/20/16</a:t>
+              <a:t>9/21/16</a:t>
             </a:fld>
             <a:endParaRPr lang="en-US"/>
           </a:p>
@@ -1304,7 +1305,7 @@
           <a:p>
             <a:fld id="{4D8523F5-3159-EA45-A3E0-FA7A05C4AA6A}" type="datetimeFigureOut">
               <a:rPr lang="en-US" smtClean="0"/>
-              <a:t>9/20/16</a:t>
+              <a:t>9/21/16</a:t>
             </a:fld>
             <a:endParaRPr lang="en-US"/>
           </a:p>
@@ -1671,7 +1672,7 @@
           <a:p>
             <a:fld id="{4D8523F5-3159-EA45-A3E0-FA7A05C4AA6A}" type="datetimeFigureOut">
               <a:rPr lang="en-US" smtClean="0"/>
-              <a:t>9/20/16</a:t>
+              <a:t>9/21/16</a:t>
             </a:fld>
             <a:endParaRPr lang="en-US"/>
           </a:p>
@@ -1789,7 +1790,7 @@
           <a:p>
             <a:fld id="{4D8523F5-3159-EA45-A3E0-FA7A05C4AA6A}" type="datetimeFigureOut">
               <a:rPr lang="en-US" smtClean="0"/>
-              <a:t>9/20/16</a:t>
+              <a:t>9/21/16</a:t>
             </a:fld>
             <a:endParaRPr lang="en-US"/>
           </a:p>
@@ -1884,7 +1885,7 @@
           <a:p>
             <a:fld id="{4D8523F5-3159-EA45-A3E0-FA7A05C4AA6A}" type="datetimeFigureOut">
               <a:rPr lang="en-US" smtClean="0"/>
-              <a:t>9/20/16</a:t>
+              <a:t>9/21/16</a:t>
             </a:fld>
             <a:endParaRPr lang="en-US"/>
           </a:p>
@@ -2161,7 +2162,7 @@
           <a:p>
             <a:fld id="{4D8523F5-3159-EA45-A3E0-FA7A05C4AA6A}" type="datetimeFigureOut">
               <a:rPr lang="en-US" smtClean="0"/>
-              <a:t>9/20/16</a:t>
+              <a:t>9/21/16</a:t>
             </a:fld>
             <a:endParaRPr lang="en-US"/>
           </a:p>
@@ -2414,7 +2415,7 @@
           <a:p>
             <a:fld id="{4D8523F5-3159-EA45-A3E0-FA7A05C4AA6A}" type="datetimeFigureOut">
               <a:rPr lang="en-US" smtClean="0"/>
-              <a:t>9/20/16</a:t>
+              <a:t>9/21/16</a:t>
             </a:fld>
             <a:endParaRPr lang="en-US"/>
           </a:p>
@@ -2627,7 +2628,7 @@
           <a:p>
             <a:fld id="{4D8523F5-3159-EA45-A3E0-FA7A05C4AA6A}" type="datetimeFigureOut">
               <a:rPr lang="en-US" smtClean="0"/>
-              <a:t>9/20/16</a:t>
+              <a:t>9/21/16</a:t>
             </a:fld>
             <a:endParaRPr lang="en-US"/>
           </a:p>
@@ -3092,6 +3093,13 @@
   <p:clrMapOvr>
     <a:masterClrMapping/>
   </p:clrMapOvr>
+  <p:timing>
+    <p:tnLst>
+      <p:par>
+        <p:cTn id="1" dur="indefinite" restart="never" nodeType="tmRoot"/>
+      </p:par>
+    </p:tnLst>
+  </p:timing>
 </p:sld>
 </file>
 
@@ -3128,8 +3136,8 @@
           <a:lstStyle/>
           <a:p>
             <a:r>
-              <a:rPr lang="en-US" smtClean="0"/>
-              <a:t>FAQ</a:t>
+              <a:rPr lang="en-US" dirty="0" smtClean="0"/>
+              <a:t>Compiling atomics</a:t>
             </a:r>
             <a:endParaRPr lang="en-US" dirty="0">
               <a:latin typeface="Gadugi" charset="0"/>
@@ -3158,24 +3166,423 @@
           <a:p>
             <a:r>
               <a:rPr lang="en-US" dirty="0" smtClean="0"/>
-              <a:t>Nesting atomics?</a:t>
+              <a:t>The naïve solution: One big lock</a:t>
+            </a:r>
+          </a:p>
+          <a:p>
+            <a:endParaRPr lang="en-US" dirty="0"/>
+          </a:p>
+          <a:p>
+            <a:r>
+              <a:rPr lang="en-US" dirty="0" smtClean="0"/>
+              <a:t>Smarter </a:t>
+            </a:r>
+            <a:r>
+              <a:rPr lang="en-US" dirty="0" smtClean="0"/>
+              <a:t>solution: Identify the portions that really need to be atomic and use smaller </a:t>
+            </a:r>
+            <a:r>
+              <a:rPr lang="en-US" dirty="0" smtClean="0"/>
+              <a:t>locks.</a:t>
             </a:r>
           </a:p>
           <a:p>
             <a:pPr lvl="1"/>
             <a:r>
               <a:rPr lang="en-US" dirty="0" smtClean="0"/>
-              <a:t>Simply look at the outermost atomic and enforce that?</a:t>
+              <a:t>E.g., Use separate locks for counters x and y</a:t>
+            </a:r>
+            <a:endParaRPr lang="en-US" dirty="0" smtClean="0"/>
+          </a:p>
+          <a:p>
+            <a:endParaRPr lang="en-US" dirty="0" smtClean="0"/>
+          </a:p>
+          <a:p>
+            <a:r>
+              <a:rPr lang="en-US" dirty="0" smtClean="0"/>
+              <a:t>Try </a:t>
+            </a:r>
+            <a:r>
+              <a:rPr lang="en-US" dirty="0" smtClean="0"/>
+              <a:t>and map atomic sections to dedicated hardware atomic instructions; reject code if not possible</a:t>
+            </a:r>
+            <a:r>
+              <a:rPr lang="en-US" dirty="0" smtClean="0"/>
+              <a:t>.</a:t>
             </a:r>
           </a:p>
           <a:p>
             <a:pPr lvl="1"/>
+            <a:r>
+              <a:rPr lang="en-US" dirty="0" err="1" smtClean="0"/>
+              <a:t>flowlet_id</a:t>
+            </a:r>
+            <a:r>
+              <a:rPr lang="en-US" dirty="0" smtClean="0"/>
+              <a:t> accesses boil down to a conditional read-modify-update</a:t>
+            </a:r>
+            <a:endParaRPr lang="en-US" dirty="0" smtClean="0"/>
+          </a:p>
+          <a:p>
             <a:endParaRPr lang="en-US" dirty="0"/>
           </a:p>
           <a:p>
-            <a:r>
-              <a:rPr lang="en-US" dirty="0" smtClean="0"/>
-              <a:t>Are we going to end up with rejected code?</a:t>
+            <a:endParaRPr lang="en-US" dirty="0"/>
+          </a:p>
+        </p:txBody>
+      </p:sp>
+    </p:spTree>
+    <p:extLst>
+      <p:ext uri="{BB962C8B-B14F-4D97-AF65-F5344CB8AC3E}">
+        <p14:creationId xmlns:p14="http://schemas.microsoft.com/office/powerpoint/2010/main" val="99975364"/>
+      </p:ext>
+    </p:extLst>
+  </p:cSld>
+  <p:clrMapOvr>
+    <a:masterClrMapping/>
+  </p:clrMapOvr>
+  <p:timing>
+    <p:tnLst>
+      <p:par>
+        <p:cTn id="1" dur="indefinite" restart="never" nodeType="tmRoot">
+          <p:childTnLst>
+            <p:seq concurrent="1" nextAc="seek">
+              <p:cTn id="2" dur="indefinite" nodeType="mainSeq">
+                <p:childTnLst>
+                  <p:par>
+                    <p:cTn id="3" fill="hold">
+                      <p:stCondLst>
+                        <p:cond delay="indefinite"/>
+                      </p:stCondLst>
+                      <p:childTnLst>
+                        <p:par>
+                          <p:cTn id="4" fill="hold">
+                            <p:stCondLst>
+                              <p:cond delay="0"/>
+                            </p:stCondLst>
+                            <p:childTnLst>
+                              <p:par>
+                                <p:cTn id="5" presetID="1" presetClass="entr" presetSubtype="0" fill="hold" nodeType="clickEffect">
+                                  <p:stCondLst>
+                                    <p:cond delay="0"/>
+                                  </p:stCondLst>
+                                  <p:childTnLst>
+                                    <p:set>
+                                      <p:cBhvr>
+                                        <p:cTn id="6" dur="1" fill="hold">
+                                          <p:stCondLst>
+                                            <p:cond delay="0"/>
+                                          </p:stCondLst>
+                                        </p:cTn>
+                                        <p:tgtEl>
+                                          <p:spTgt spid="4">
+                                            <p:txEl>
+                                              <p:pRg st="0" end="0"/>
+                                            </p:txEl>
+                                          </p:spTgt>
+                                        </p:tgtEl>
+                                        <p:attrNameLst>
+                                          <p:attrName>style.visibility</p:attrName>
+                                        </p:attrNameLst>
+                                      </p:cBhvr>
+                                      <p:to>
+                                        <p:strVal val="visible"/>
+                                      </p:to>
+                                    </p:set>
+                                  </p:childTnLst>
+                                </p:cTn>
+                              </p:par>
+                            </p:childTnLst>
+                          </p:cTn>
+                        </p:par>
+                      </p:childTnLst>
+                    </p:cTn>
+                  </p:par>
+                  <p:par>
+                    <p:cTn id="7" fill="hold">
+                      <p:stCondLst>
+                        <p:cond delay="indefinite"/>
+                      </p:stCondLst>
+                      <p:childTnLst>
+                        <p:par>
+                          <p:cTn id="8" fill="hold">
+                            <p:stCondLst>
+                              <p:cond delay="0"/>
+                            </p:stCondLst>
+                            <p:childTnLst>
+                              <p:par>
+                                <p:cTn id="9" presetID="1" presetClass="entr" presetSubtype="0" fill="hold" nodeType="clickEffect">
+                                  <p:stCondLst>
+                                    <p:cond delay="0"/>
+                                  </p:stCondLst>
+                                  <p:childTnLst>
+                                    <p:set>
+                                      <p:cBhvr>
+                                        <p:cTn id="10" dur="1" fill="hold">
+                                          <p:stCondLst>
+                                            <p:cond delay="0"/>
+                                          </p:stCondLst>
+                                        </p:cTn>
+                                        <p:tgtEl>
+                                          <p:spTgt spid="4">
+                                            <p:txEl>
+                                              <p:pRg st="2" end="2"/>
+                                            </p:txEl>
+                                          </p:spTgt>
+                                        </p:tgtEl>
+                                        <p:attrNameLst>
+                                          <p:attrName>style.visibility</p:attrName>
+                                        </p:attrNameLst>
+                                      </p:cBhvr>
+                                      <p:to>
+                                        <p:strVal val="visible"/>
+                                      </p:to>
+                                    </p:set>
+                                  </p:childTnLst>
+                                </p:cTn>
+                              </p:par>
+                              <p:par>
+                                <p:cTn id="11" presetID="1" presetClass="entr" presetSubtype="0" fill="hold" nodeType="withEffect">
+                                  <p:stCondLst>
+                                    <p:cond delay="0"/>
+                                  </p:stCondLst>
+                                  <p:childTnLst>
+                                    <p:set>
+                                      <p:cBhvr>
+                                        <p:cTn id="12" dur="1" fill="hold">
+                                          <p:stCondLst>
+                                            <p:cond delay="0"/>
+                                          </p:stCondLst>
+                                        </p:cTn>
+                                        <p:tgtEl>
+                                          <p:spTgt spid="4">
+                                            <p:txEl>
+                                              <p:pRg st="3" end="3"/>
+                                            </p:txEl>
+                                          </p:spTgt>
+                                        </p:tgtEl>
+                                        <p:attrNameLst>
+                                          <p:attrName>style.visibility</p:attrName>
+                                        </p:attrNameLst>
+                                      </p:cBhvr>
+                                      <p:to>
+                                        <p:strVal val="visible"/>
+                                      </p:to>
+                                    </p:set>
+                                  </p:childTnLst>
+                                </p:cTn>
+                              </p:par>
+                            </p:childTnLst>
+                          </p:cTn>
+                        </p:par>
+                      </p:childTnLst>
+                    </p:cTn>
+                  </p:par>
+                  <p:par>
+                    <p:cTn id="13" fill="hold">
+                      <p:stCondLst>
+                        <p:cond delay="indefinite"/>
+                      </p:stCondLst>
+                      <p:childTnLst>
+                        <p:par>
+                          <p:cTn id="14" fill="hold">
+                            <p:stCondLst>
+                              <p:cond delay="0"/>
+                            </p:stCondLst>
+                            <p:childTnLst>
+                              <p:par>
+                                <p:cTn id="15" presetID="1" presetClass="entr" presetSubtype="0" fill="hold" nodeType="clickEffect">
+                                  <p:stCondLst>
+                                    <p:cond delay="0"/>
+                                  </p:stCondLst>
+                                  <p:childTnLst>
+                                    <p:set>
+                                      <p:cBhvr>
+                                        <p:cTn id="16" dur="1" fill="hold">
+                                          <p:stCondLst>
+                                            <p:cond delay="0"/>
+                                          </p:stCondLst>
+                                        </p:cTn>
+                                        <p:tgtEl>
+                                          <p:spTgt spid="4">
+                                            <p:txEl>
+                                              <p:pRg st="5" end="5"/>
+                                            </p:txEl>
+                                          </p:spTgt>
+                                        </p:tgtEl>
+                                        <p:attrNameLst>
+                                          <p:attrName>style.visibility</p:attrName>
+                                        </p:attrNameLst>
+                                      </p:cBhvr>
+                                      <p:to>
+                                        <p:strVal val="visible"/>
+                                      </p:to>
+                                    </p:set>
+                                  </p:childTnLst>
+                                </p:cTn>
+                              </p:par>
+                              <p:par>
+                                <p:cTn id="17" presetID="1" presetClass="entr" presetSubtype="0" fill="hold" nodeType="withEffect">
+                                  <p:stCondLst>
+                                    <p:cond delay="0"/>
+                                  </p:stCondLst>
+                                  <p:childTnLst>
+                                    <p:set>
+                                      <p:cBhvr>
+                                        <p:cTn id="18" dur="1" fill="hold">
+                                          <p:stCondLst>
+                                            <p:cond delay="0"/>
+                                          </p:stCondLst>
+                                        </p:cTn>
+                                        <p:tgtEl>
+                                          <p:spTgt spid="4">
+                                            <p:txEl>
+                                              <p:pRg st="6" end="6"/>
+                                            </p:txEl>
+                                          </p:spTgt>
+                                        </p:tgtEl>
+                                        <p:attrNameLst>
+                                          <p:attrName>style.visibility</p:attrName>
+                                        </p:attrNameLst>
+                                      </p:cBhvr>
+                                      <p:to>
+                                        <p:strVal val="visible"/>
+                                      </p:to>
+                                    </p:set>
+                                  </p:childTnLst>
+                                </p:cTn>
+                              </p:par>
+                            </p:childTnLst>
+                          </p:cTn>
+                        </p:par>
+                      </p:childTnLst>
+                    </p:cTn>
+                  </p:par>
+                </p:childTnLst>
+              </p:cTn>
+              <p:prevCondLst>
+                <p:cond evt="onPrev" delay="0">
+                  <p:tgtEl>
+                    <p:sldTgt/>
+                  </p:tgtEl>
+                </p:cond>
+              </p:prevCondLst>
+              <p:nextCondLst>
+                <p:cond evt="onNext" delay="0">
+                  <p:tgtEl>
+                    <p:sldTgt/>
+                  </p:tgtEl>
+                </p:cond>
+              </p:nextCondLst>
+            </p:seq>
+          </p:childTnLst>
+        </p:cTn>
+      </p:par>
+    </p:tnLst>
+  </p:timing>
+</p:sld>
+</file>
+
+<file path=ppt/slides/slide11.xml><?xml version="1.0" encoding="utf-8"?>
+<p:sld xmlns:a="http://schemas.openxmlformats.org/drawingml/2006/main" xmlns:r="http://schemas.openxmlformats.org/officeDocument/2006/relationships" xmlns:p="http://schemas.openxmlformats.org/presentationml/2006/main">
+  <p:cSld>
+    <p:spTree>
+      <p:nvGrpSpPr>
+        <p:cNvPr id="1" name=""/>
+        <p:cNvGrpSpPr/>
+        <p:nvPr/>
+      </p:nvGrpSpPr>
+      <p:grpSpPr>
+        <a:xfrm>
+          <a:off x="0" y="0"/>
+          <a:ext cx="0" cy="0"/>
+          <a:chOff x="0" y="0"/>
+          <a:chExt cx="0" cy="0"/>
+        </a:xfrm>
+      </p:grpSpPr>
+      <p:sp>
+        <p:nvSpPr>
+          <p:cNvPr id="2" name="Title 1"/>
+          <p:cNvSpPr>
+            <a:spLocks noGrp="1"/>
+          </p:cNvSpPr>
+          <p:nvPr>
+            <p:ph type="title"/>
+          </p:nvPr>
+        </p:nvSpPr>
+        <p:spPr/>
+        <p:txBody>
+          <a:bodyPr/>
+          <a:lstStyle/>
+          <a:p>
+            <a:r>
+              <a:rPr lang="en-US" dirty="0" smtClean="0"/>
+              <a:t>Some considerations with atomics</a:t>
+            </a:r>
+            <a:endParaRPr lang="en-US" dirty="0">
+              <a:latin typeface="Gadugi" charset="0"/>
+              <a:ea typeface="Gadugi" charset="0"/>
+              <a:cs typeface="Gadugi" charset="0"/>
+            </a:endParaRPr>
+          </a:p>
+        </p:txBody>
+      </p:sp>
+      <p:sp>
+        <p:nvSpPr>
+          <p:cNvPr id="4" name="Content Placeholder 3"/>
+          <p:cNvSpPr>
+            <a:spLocks noGrp="1"/>
+          </p:cNvSpPr>
+          <p:nvPr>
+            <p:ph idx="1"/>
+          </p:nvPr>
+        </p:nvSpPr>
+        <p:spPr/>
+        <p:txBody>
+          <a:bodyPr>
+            <a:normAutofit/>
+          </a:bodyPr>
+          <a:lstStyle/>
+          <a:p>
+            <a:r>
+              <a:rPr lang="en-US" dirty="0" smtClean="0"/>
+              <a:t>Nesting </a:t>
+            </a:r>
+            <a:r>
+              <a:rPr lang="en-US" dirty="0" smtClean="0"/>
+              <a:t>atomics?: </a:t>
+            </a:r>
+            <a:r>
+              <a:rPr lang="en-US" dirty="0" smtClean="0"/>
+              <a:t>Maybe don’t allow </a:t>
+            </a:r>
+            <a:r>
+              <a:rPr lang="en-US" smtClean="0"/>
+              <a:t>it?</a:t>
+            </a:r>
+            <a:endParaRPr lang="en-US" dirty="0" smtClean="0"/>
+          </a:p>
+          <a:p>
+            <a:r>
+              <a:rPr lang="en-US" dirty="0" smtClean="0"/>
+              <a:t>Mixing atomic and non-atomic code: Maybe don’t allow it?</a:t>
+            </a:r>
+          </a:p>
+          <a:p>
+            <a:pPr lvl="1"/>
+            <a:r>
+              <a:rPr lang="en-US" dirty="0" smtClean="0"/>
+              <a:t>Again, maybe make expressions/assignments atomic by default.</a:t>
+            </a:r>
+          </a:p>
+          <a:p>
+            <a:r>
+              <a:rPr lang="en-US" dirty="0" smtClean="0"/>
+              <a:t>Are </a:t>
+            </a:r>
+            <a:r>
+              <a:rPr lang="en-US" dirty="0" smtClean="0"/>
+              <a:t>we going to end up with rejected code?</a:t>
             </a:r>
           </a:p>
           <a:p>
@@ -3240,6 +3647,400 @@
   <p:clrMapOvr>
     <a:masterClrMapping/>
   </p:clrMapOvr>
+  <p:timing>
+    <p:tnLst>
+      <p:par>
+        <p:cTn id="1" dur="indefinite" restart="never" nodeType="tmRoot">
+          <p:childTnLst>
+            <p:seq concurrent="1" nextAc="seek">
+              <p:cTn id="2" dur="indefinite" nodeType="mainSeq">
+                <p:childTnLst>
+                  <p:par>
+                    <p:cTn id="3" fill="hold">
+                      <p:stCondLst>
+                        <p:cond delay="indefinite"/>
+                      </p:stCondLst>
+                      <p:childTnLst>
+                        <p:par>
+                          <p:cTn id="4" fill="hold">
+                            <p:stCondLst>
+                              <p:cond delay="0"/>
+                            </p:stCondLst>
+                            <p:childTnLst>
+                              <p:par>
+                                <p:cTn id="5" presetID="1" presetClass="entr" presetSubtype="0" fill="hold" nodeType="clickEffect">
+                                  <p:stCondLst>
+                                    <p:cond delay="0"/>
+                                  </p:stCondLst>
+                                  <p:childTnLst>
+                                    <p:set>
+                                      <p:cBhvr>
+                                        <p:cTn id="6" dur="1" fill="hold">
+                                          <p:stCondLst>
+                                            <p:cond delay="0"/>
+                                          </p:stCondLst>
+                                        </p:cTn>
+                                        <p:tgtEl>
+                                          <p:spTgt spid="4">
+                                            <p:txEl>
+                                              <p:pRg st="0" end="0"/>
+                                            </p:txEl>
+                                          </p:spTgt>
+                                        </p:tgtEl>
+                                        <p:attrNameLst>
+                                          <p:attrName>style.visibility</p:attrName>
+                                        </p:attrNameLst>
+                                      </p:cBhvr>
+                                      <p:to>
+                                        <p:strVal val="visible"/>
+                                      </p:to>
+                                    </p:set>
+                                  </p:childTnLst>
+                                </p:cTn>
+                              </p:par>
+                            </p:childTnLst>
+                          </p:cTn>
+                        </p:par>
+                      </p:childTnLst>
+                    </p:cTn>
+                  </p:par>
+                  <p:par>
+                    <p:cTn id="7" fill="hold">
+                      <p:stCondLst>
+                        <p:cond delay="indefinite"/>
+                      </p:stCondLst>
+                      <p:childTnLst>
+                        <p:par>
+                          <p:cTn id="8" fill="hold">
+                            <p:stCondLst>
+                              <p:cond delay="0"/>
+                            </p:stCondLst>
+                            <p:childTnLst>
+                              <p:par>
+                                <p:cTn id="9" presetID="1" presetClass="entr" presetSubtype="0" fill="hold" nodeType="clickEffect">
+                                  <p:stCondLst>
+                                    <p:cond delay="0"/>
+                                  </p:stCondLst>
+                                  <p:childTnLst>
+                                    <p:set>
+                                      <p:cBhvr>
+                                        <p:cTn id="10" dur="1" fill="hold">
+                                          <p:stCondLst>
+                                            <p:cond delay="0"/>
+                                          </p:stCondLst>
+                                        </p:cTn>
+                                        <p:tgtEl>
+                                          <p:spTgt spid="4">
+                                            <p:txEl>
+                                              <p:pRg st="1" end="1"/>
+                                            </p:txEl>
+                                          </p:spTgt>
+                                        </p:tgtEl>
+                                        <p:attrNameLst>
+                                          <p:attrName>style.visibility</p:attrName>
+                                        </p:attrNameLst>
+                                      </p:cBhvr>
+                                      <p:to>
+                                        <p:strVal val="visible"/>
+                                      </p:to>
+                                    </p:set>
+                                  </p:childTnLst>
+                                </p:cTn>
+                              </p:par>
+                              <p:par>
+                                <p:cTn id="11" presetID="1" presetClass="entr" presetSubtype="0" fill="hold" nodeType="withEffect">
+                                  <p:stCondLst>
+                                    <p:cond delay="0"/>
+                                  </p:stCondLst>
+                                  <p:childTnLst>
+                                    <p:set>
+                                      <p:cBhvr>
+                                        <p:cTn id="12" dur="1" fill="hold">
+                                          <p:stCondLst>
+                                            <p:cond delay="0"/>
+                                          </p:stCondLst>
+                                        </p:cTn>
+                                        <p:tgtEl>
+                                          <p:spTgt spid="4">
+                                            <p:txEl>
+                                              <p:pRg st="2" end="2"/>
+                                            </p:txEl>
+                                          </p:spTgt>
+                                        </p:tgtEl>
+                                        <p:attrNameLst>
+                                          <p:attrName>style.visibility</p:attrName>
+                                        </p:attrNameLst>
+                                      </p:cBhvr>
+                                      <p:to>
+                                        <p:strVal val="visible"/>
+                                      </p:to>
+                                    </p:set>
+                                  </p:childTnLst>
+                                </p:cTn>
+                              </p:par>
+                            </p:childTnLst>
+                          </p:cTn>
+                        </p:par>
+                      </p:childTnLst>
+                    </p:cTn>
+                  </p:par>
+                  <p:par>
+                    <p:cTn id="13" fill="hold">
+                      <p:stCondLst>
+                        <p:cond delay="indefinite"/>
+                      </p:stCondLst>
+                      <p:childTnLst>
+                        <p:par>
+                          <p:cTn id="14" fill="hold">
+                            <p:stCondLst>
+                              <p:cond delay="0"/>
+                            </p:stCondLst>
+                            <p:childTnLst>
+                              <p:par>
+                                <p:cTn id="15" presetID="1" presetClass="entr" presetSubtype="0" fill="hold" nodeType="clickEffect">
+                                  <p:stCondLst>
+                                    <p:cond delay="0"/>
+                                  </p:stCondLst>
+                                  <p:childTnLst>
+                                    <p:set>
+                                      <p:cBhvr>
+                                        <p:cTn id="16" dur="1" fill="hold">
+                                          <p:stCondLst>
+                                            <p:cond delay="0"/>
+                                          </p:stCondLst>
+                                        </p:cTn>
+                                        <p:tgtEl>
+                                          <p:spTgt spid="4">
+                                            <p:txEl>
+                                              <p:pRg st="3" end="3"/>
+                                            </p:txEl>
+                                          </p:spTgt>
+                                        </p:tgtEl>
+                                        <p:attrNameLst>
+                                          <p:attrName>style.visibility</p:attrName>
+                                        </p:attrNameLst>
+                                      </p:cBhvr>
+                                      <p:to>
+                                        <p:strVal val="visible"/>
+                                      </p:to>
+                                    </p:set>
+                                  </p:childTnLst>
+                                </p:cTn>
+                              </p:par>
+                              <p:par>
+                                <p:cTn id="17" presetID="1" presetClass="entr" presetSubtype="0" fill="hold" nodeType="withEffect">
+                                  <p:stCondLst>
+                                    <p:cond delay="0"/>
+                                  </p:stCondLst>
+                                  <p:childTnLst>
+                                    <p:set>
+                                      <p:cBhvr>
+                                        <p:cTn id="18" dur="1" fill="hold">
+                                          <p:stCondLst>
+                                            <p:cond delay="0"/>
+                                          </p:stCondLst>
+                                        </p:cTn>
+                                        <p:tgtEl>
+                                          <p:spTgt spid="4">
+                                            <p:txEl>
+                                              <p:pRg st="4" end="4"/>
+                                            </p:txEl>
+                                          </p:spTgt>
+                                        </p:tgtEl>
+                                        <p:attrNameLst>
+                                          <p:attrName>style.visibility</p:attrName>
+                                        </p:attrNameLst>
+                                      </p:cBhvr>
+                                      <p:to>
+                                        <p:strVal val="visible"/>
+                                      </p:to>
+                                    </p:set>
+                                  </p:childTnLst>
+                                </p:cTn>
+                              </p:par>
+                              <p:par>
+                                <p:cTn id="19" presetID="1" presetClass="entr" presetSubtype="0" fill="hold" nodeType="withEffect">
+                                  <p:stCondLst>
+                                    <p:cond delay="0"/>
+                                  </p:stCondLst>
+                                  <p:childTnLst>
+                                    <p:set>
+                                      <p:cBhvr>
+                                        <p:cTn id="20" dur="1" fill="hold">
+                                          <p:stCondLst>
+                                            <p:cond delay="0"/>
+                                          </p:stCondLst>
+                                        </p:cTn>
+                                        <p:tgtEl>
+                                          <p:spTgt spid="4">
+                                            <p:txEl>
+                                              <p:pRg st="5" end="5"/>
+                                            </p:txEl>
+                                          </p:spTgt>
+                                        </p:tgtEl>
+                                        <p:attrNameLst>
+                                          <p:attrName>style.visibility</p:attrName>
+                                        </p:attrNameLst>
+                                      </p:cBhvr>
+                                      <p:to>
+                                        <p:strVal val="visible"/>
+                                      </p:to>
+                                    </p:set>
+                                  </p:childTnLst>
+                                </p:cTn>
+                              </p:par>
+                              <p:par>
+                                <p:cTn id="21" presetID="1" presetClass="entr" presetSubtype="0" fill="hold" nodeType="withEffect">
+                                  <p:stCondLst>
+                                    <p:cond delay="0"/>
+                                  </p:stCondLst>
+                                  <p:childTnLst>
+                                    <p:set>
+                                      <p:cBhvr>
+                                        <p:cTn id="22" dur="1" fill="hold">
+                                          <p:stCondLst>
+                                            <p:cond delay="0"/>
+                                          </p:stCondLst>
+                                        </p:cTn>
+                                        <p:tgtEl>
+                                          <p:spTgt spid="4">
+                                            <p:txEl>
+                                              <p:pRg st="6" end="6"/>
+                                            </p:txEl>
+                                          </p:spTgt>
+                                        </p:tgtEl>
+                                        <p:attrNameLst>
+                                          <p:attrName>style.visibility</p:attrName>
+                                        </p:attrNameLst>
+                                      </p:cBhvr>
+                                      <p:to>
+                                        <p:strVal val="visible"/>
+                                      </p:to>
+                                    </p:set>
+                                  </p:childTnLst>
+                                </p:cTn>
+                              </p:par>
+                              <p:par>
+                                <p:cTn id="23" presetID="1" presetClass="entr" presetSubtype="0" fill="hold" nodeType="withEffect">
+                                  <p:stCondLst>
+                                    <p:cond delay="0"/>
+                                  </p:stCondLst>
+                                  <p:childTnLst>
+                                    <p:set>
+                                      <p:cBhvr>
+                                        <p:cTn id="24" dur="1" fill="hold">
+                                          <p:stCondLst>
+                                            <p:cond delay="0"/>
+                                          </p:stCondLst>
+                                        </p:cTn>
+                                        <p:tgtEl>
+                                          <p:spTgt spid="4">
+                                            <p:txEl>
+                                              <p:pRg st="7" end="7"/>
+                                            </p:txEl>
+                                          </p:spTgt>
+                                        </p:tgtEl>
+                                        <p:attrNameLst>
+                                          <p:attrName>style.visibility</p:attrName>
+                                        </p:attrNameLst>
+                                      </p:cBhvr>
+                                      <p:to>
+                                        <p:strVal val="visible"/>
+                                      </p:to>
+                                    </p:set>
+                                  </p:childTnLst>
+                                </p:cTn>
+                              </p:par>
+                              <p:par>
+                                <p:cTn id="25" presetID="1" presetClass="entr" presetSubtype="0" fill="hold" nodeType="withEffect">
+                                  <p:stCondLst>
+                                    <p:cond delay="0"/>
+                                  </p:stCondLst>
+                                  <p:childTnLst>
+                                    <p:set>
+                                      <p:cBhvr>
+                                        <p:cTn id="26" dur="1" fill="hold">
+                                          <p:stCondLst>
+                                            <p:cond delay="0"/>
+                                          </p:stCondLst>
+                                        </p:cTn>
+                                        <p:tgtEl>
+                                          <p:spTgt spid="4">
+                                            <p:txEl>
+                                              <p:pRg st="8" end="8"/>
+                                            </p:txEl>
+                                          </p:spTgt>
+                                        </p:tgtEl>
+                                        <p:attrNameLst>
+                                          <p:attrName>style.visibility</p:attrName>
+                                        </p:attrNameLst>
+                                      </p:cBhvr>
+                                      <p:to>
+                                        <p:strVal val="visible"/>
+                                      </p:to>
+                                    </p:set>
+                                  </p:childTnLst>
+                                </p:cTn>
+                              </p:par>
+                              <p:par>
+                                <p:cTn id="27" presetID="1" presetClass="entr" presetSubtype="0" fill="hold" nodeType="withEffect">
+                                  <p:stCondLst>
+                                    <p:cond delay="0"/>
+                                  </p:stCondLst>
+                                  <p:childTnLst>
+                                    <p:set>
+                                      <p:cBhvr>
+                                        <p:cTn id="28" dur="1" fill="hold">
+                                          <p:stCondLst>
+                                            <p:cond delay="0"/>
+                                          </p:stCondLst>
+                                        </p:cTn>
+                                        <p:tgtEl>
+                                          <p:spTgt spid="4">
+                                            <p:txEl>
+                                              <p:pRg st="9" end="9"/>
+                                            </p:txEl>
+                                          </p:spTgt>
+                                        </p:tgtEl>
+                                        <p:attrNameLst>
+                                          <p:attrName>style.visibility</p:attrName>
+                                        </p:attrNameLst>
+                                      </p:cBhvr>
+                                      <p:to>
+                                        <p:strVal val="visible"/>
+                                      </p:to>
+                                    </p:set>
+                                  </p:childTnLst>
+                                </p:cTn>
+                              </p:par>
+                            </p:childTnLst>
+                          </p:cTn>
+                        </p:par>
+                      </p:childTnLst>
+                    </p:cTn>
+                  </p:par>
+                </p:childTnLst>
+              </p:cTn>
+              <p:prevCondLst>
+                <p:cond evt="onPrev" delay="0">
+                  <p:tgtEl>
+                    <p:sldTgt/>
+                  </p:tgtEl>
+                </p:cond>
+              </p:prevCondLst>
+              <p:nextCondLst>
+                <p:cond evt="onNext" delay="0">
+                  <p:tgtEl>
+                    <p:sldTgt/>
+                  </p:tgtEl>
+                </p:cond>
+              </p:nextCondLst>
+            </p:seq>
+          </p:childTnLst>
+        </p:cTn>
+      </p:par>
+    </p:tnLst>
+  </p:timing>
 </p:sld>
 </file>
 
@@ -3326,7 +4127,11 @@
           <a:p>
             <a:r>
               <a:rPr lang="en-US" dirty="0" smtClean="0"/>
-              <a:t>For now, not worrying about control plane interactions</a:t>
+              <a:t>Caveat: for </a:t>
+            </a:r>
+            <a:r>
+              <a:rPr lang="en-US" dirty="0" smtClean="0"/>
+              <a:t>now, not worrying about control plane interactions</a:t>
             </a:r>
           </a:p>
           <a:p>
@@ -3363,6 +4168,245 @@
   <p:clrMapOvr>
     <a:masterClrMapping/>
   </p:clrMapOvr>
+  <p:timing>
+    <p:tnLst>
+      <p:par>
+        <p:cTn id="1" dur="indefinite" restart="never" nodeType="tmRoot">
+          <p:childTnLst>
+            <p:seq concurrent="1" nextAc="seek">
+              <p:cTn id="2" dur="indefinite" nodeType="mainSeq">
+                <p:childTnLst>
+                  <p:par>
+                    <p:cTn id="3" fill="hold">
+                      <p:stCondLst>
+                        <p:cond delay="indefinite"/>
+                      </p:stCondLst>
+                      <p:childTnLst>
+                        <p:par>
+                          <p:cTn id="4" fill="hold">
+                            <p:stCondLst>
+                              <p:cond delay="0"/>
+                            </p:stCondLst>
+                            <p:childTnLst>
+                              <p:par>
+                                <p:cTn id="5" presetID="1" presetClass="entr" presetSubtype="0" fill="hold" nodeType="clickEffect">
+                                  <p:stCondLst>
+                                    <p:cond delay="0"/>
+                                  </p:stCondLst>
+                                  <p:childTnLst>
+                                    <p:set>
+                                      <p:cBhvr>
+                                        <p:cTn id="6" dur="1" fill="hold">
+                                          <p:stCondLst>
+                                            <p:cond delay="0"/>
+                                          </p:stCondLst>
+                                        </p:cTn>
+                                        <p:tgtEl>
+                                          <p:spTgt spid="4">
+                                            <p:txEl>
+                                              <p:pRg st="0" end="0"/>
+                                            </p:txEl>
+                                          </p:spTgt>
+                                        </p:tgtEl>
+                                        <p:attrNameLst>
+                                          <p:attrName>style.visibility</p:attrName>
+                                        </p:attrNameLst>
+                                      </p:cBhvr>
+                                      <p:to>
+                                        <p:strVal val="visible"/>
+                                      </p:to>
+                                    </p:set>
+                                  </p:childTnLst>
+                                </p:cTn>
+                              </p:par>
+                            </p:childTnLst>
+                          </p:cTn>
+                        </p:par>
+                      </p:childTnLst>
+                    </p:cTn>
+                  </p:par>
+                  <p:par>
+                    <p:cTn id="7" fill="hold">
+                      <p:stCondLst>
+                        <p:cond delay="indefinite"/>
+                      </p:stCondLst>
+                      <p:childTnLst>
+                        <p:par>
+                          <p:cTn id="8" fill="hold">
+                            <p:stCondLst>
+                              <p:cond delay="0"/>
+                            </p:stCondLst>
+                            <p:childTnLst>
+                              <p:par>
+                                <p:cTn id="9" presetID="1" presetClass="entr" presetSubtype="0" fill="hold" nodeType="clickEffect">
+                                  <p:stCondLst>
+                                    <p:cond delay="0"/>
+                                  </p:stCondLst>
+                                  <p:childTnLst>
+                                    <p:set>
+                                      <p:cBhvr>
+                                        <p:cTn id="10" dur="1" fill="hold">
+                                          <p:stCondLst>
+                                            <p:cond delay="0"/>
+                                          </p:stCondLst>
+                                        </p:cTn>
+                                        <p:tgtEl>
+                                          <p:spTgt spid="4">
+                                            <p:txEl>
+                                              <p:pRg st="2" end="2"/>
+                                            </p:txEl>
+                                          </p:spTgt>
+                                        </p:tgtEl>
+                                        <p:attrNameLst>
+                                          <p:attrName>style.visibility</p:attrName>
+                                        </p:attrNameLst>
+                                      </p:cBhvr>
+                                      <p:to>
+                                        <p:strVal val="visible"/>
+                                      </p:to>
+                                    </p:set>
+                                  </p:childTnLst>
+                                </p:cTn>
+                              </p:par>
+                            </p:childTnLst>
+                          </p:cTn>
+                        </p:par>
+                      </p:childTnLst>
+                    </p:cTn>
+                  </p:par>
+                  <p:par>
+                    <p:cTn id="11" fill="hold">
+                      <p:stCondLst>
+                        <p:cond delay="indefinite"/>
+                      </p:stCondLst>
+                      <p:childTnLst>
+                        <p:par>
+                          <p:cTn id="12" fill="hold">
+                            <p:stCondLst>
+                              <p:cond delay="0"/>
+                            </p:stCondLst>
+                            <p:childTnLst>
+                              <p:par>
+                                <p:cTn id="13" presetID="1" presetClass="entr" presetSubtype="0" fill="hold" nodeType="clickEffect">
+                                  <p:stCondLst>
+                                    <p:cond delay="0"/>
+                                  </p:stCondLst>
+                                  <p:childTnLst>
+                                    <p:set>
+                                      <p:cBhvr>
+                                        <p:cTn id="14" dur="1" fill="hold">
+                                          <p:stCondLst>
+                                            <p:cond delay="0"/>
+                                          </p:stCondLst>
+                                        </p:cTn>
+                                        <p:tgtEl>
+                                          <p:spTgt spid="4">
+                                            <p:txEl>
+                                              <p:pRg st="4" end="4"/>
+                                            </p:txEl>
+                                          </p:spTgt>
+                                        </p:tgtEl>
+                                        <p:attrNameLst>
+                                          <p:attrName>style.visibility</p:attrName>
+                                        </p:attrNameLst>
+                                      </p:cBhvr>
+                                      <p:to>
+                                        <p:strVal val="visible"/>
+                                      </p:to>
+                                    </p:set>
+                                  </p:childTnLst>
+                                </p:cTn>
+                              </p:par>
+                              <p:par>
+                                <p:cTn id="15" presetID="1" presetClass="entr" presetSubtype="0" fill="hold" nodeType="withEffect">
+                                  <p:stCondLst>
+                                    <p:cond delay="0"/>
+                                  </p:stCondLst>
+                                  <p:childTnLst>
+                                    <p:set>
+                                      <p:cBhvr>
+                                        <p:cTn id="16" dur="1" fill="hold">
+                                          <p:stCondLst>
+                                            <p:cond delay="0"/>
+                                          </p:stCondLst>
+                                        </p:cTn>
+                                        <p:tgtEl>
+                                          <p:spTgt spid="4">
+                                            <p:txEl>
+                                              <p:pRg st="5" end="5"/>
+                                            </p:txEl>
+                                          </p:spTgt>
+                                        </p:tgtEl>
+                                        <p:attrNameLst>
+                                          <p:attrName>style.visibility</p:attrName>
+                                        </p:attrNameLst>
+                                      </p:cBhvr>
+                                      <p:to>
+                                        <p:strVal val="visible"/>
+                                      </p:to>
+                                    </p:set>
+                                  </p:childTnLst>
+                                </p:cTn>
+                              </p:par>
+                              <p:par>
+                                <p:cTn id="17" presetID="1" presetClass="entr" presetSubtype="0" fill="hold" nodeType="withEffect">
+                                  <p:stCondLst>
+                                    <p:cond delay="0"/>
+                                  </p:stCondLst>
+                                  <p:childTnLst>
+                                    <p:set>
+                                      <p:cBhvr>
+                                        <p:cTn id="18" dur="1" fill="hold">
+                                          <p:stCondLst>
+                                            <p:cond delay="0"/>
+                                          </p:stCondLst>
+                                        </p:cTn>
+                                        <p:tgtEl>
+                                          <p:spTgt spid="4">
+                                            <p:txEl>
+                                              <p:pRg st="6" end="6"/>
+                                            </p:txEl>
+                                          </p:spTgt>
+                                        </p:tgtEl>
+                                        <p:attrNameLst>
+                                          <p:attrName>style.visibility</p:attrName>
+                                        </p:attrNameLst>
+                                      </p:cBhvr>
+                                      <p:to>
+                                        <p:strVal val="visible"/>
+                                      </p:to>
+                                    </p:set>
+                                  </p:childTnLst>
+                                </p:cTn>
+                              </p:par>
+                            </p:childTnLst>
+                          </p:cTn>
+                        </p:par>
+                      </p:childTnLst>
+                    </p:cTn>
+                  </p:par>
+                </p:childTnLst>
+              </p:cTn>
+              <p:prevCondLst>
+                <p:cond evt="onPrev" delay="0">
+                  <p:tgtEl>
+                    <p:sldTgt/>
+                  </p:tgtEl>
+                </p:cond>
+              </p:prevCondLst>
+              <p:nextCondLst>
+                <p:cond evt="onNext" delay="0">
+                  <p:tgtEl>
+                    <p:sldTgt/>
+                  </p:tgtEl>
+                </p:cond>
+              </p:nextCondLst>
+            </p:seq>
+          </p:childTnLst>
+        </p:cTn>
+      </p:par>
+    </p:tnLst>
+  </p:timing>
 </p:sld>
 </file>
 
@@ -3429,7 +4473,15 @@
           <a:p>
             <a:r>
               <a:rPr lang="en-US" dirty="0" smtClean="0"/>
-              <a:t>Thread: the sequence of steps corresponding to processing a single packet in either a control-flow block or a parser block.</a:t>
+              <a:t>Thread: the sequence of steps </a:t>
+            </a:r>
+            <a:r>
+              <a:rPr lang="en-US" dirty="0" smtClean="0"/>
+              <a:t>processing </a:t>
+            </a:r>
+            <a:r>
+              <a:rPr lang="en-US" dirty="0" smtClean="0"/>
+              <a:t>a single packet in either a control-flow block or a parser block.</a:t>
             </a:r>
           </a:p>
           <a:p>
@@ -3472,6 +4524,232 @@
   <p:clrMapOvr>
     <a:masterClrMapping/>
   </p:clrMapOvr>
+  <p:timing>
+    <p:tnLst>
+      <p:par>
+        <p:cTn id="1" dur="indefinite" restart="never" nodeType="tmRoot">
+          <p:childTnLst>
+            <p:seq concurrent="1" nextAc="seek">
+              <p:cTn id="2" dur="indefinite" nodeType="mainSeq">
+                <p:childTnLst>
+                  <p:par>
+                    <p:cTn id="3" fill="hold">
+                      <p:stCondLst>
+                        <p:cond delay="indefinite"/>
+                      </p:stCondLst>
+                      <p:childTnLst>
+                        <p:par>
+                          <p:cTn id="4" fill="hold">
+                            <p:stCondLst>
+                              <p:cond delay="0"/>
+                            </p:stCondLst>
+                            <p:childTnLst>
+                              <p:par>
+                                <p:cTn id="5" presetID="1" presetClass="entr" presetSubtype="0" fill="hold" nodeType="clickEffect">
+                                  <p:stCondLst>
+                                    <p:cond delay="0"/>
+                                  </p:stCondLst>
+                                  <p:childTnLst>
+                                    <p:set>
+                                      <p:cBhvr>
+                                        <p:cTn id="6" dur="1" fill="hold">
+                                          <p:stCondLst>
+                                            <p:cond delay="0"/>
+                                          </p:stCondLst>
+                                        </p:cTn>
+                                        <p:tgtEl>
+                                          <p:spTgt spid="4">
+                                            <p:txEl>
+                                              <p:pRg st="0" end="0"/>
+                                            </p:txEl>
+                                          </p:spTgt>
+                                        </p:tgtEl>
+                                        <p:attrNameLst>
+                                          <p:attrName>style.visibility</p:attrName>
+                                        </p:attrNameLst>
+                                      </p:cBhvr>
+                                      <p:to>
+                                        <p:strVal val="visible"/>
+                                      </p:to>
+                                    </p:set>
+                                  </p:childTnLst>
+                                </p:cTn>
+                              </p:par>
+                            </p:childTnLst>
+                          </p:cTn>
+                        </p:par>
+                      </p:childTnLst>
+                    </p:cTn>
+                  </p:par>
+                  <p:par>
+                    <p:cTn id="7" fill="hold">
+                      <p:stCondLst>
+                        <p:cond delay="indefinite"/>
+                      </p:stCondLst>
+                      <p:childTnLst>
+                        <p:par>
+                          <p:cTn id="8" fill="hold">
+                            <p:stCondLst>
+                              <p:cond delay="0"/>
+                            </p:stCondLst>
+                            <p:childTnLst>
+                              <p:par>
+                                <p:cTn id="9" presetID="1" presetClass="entr" presetSubtype="0" fill="hold" nodeType="clickEffect">
+                                  <p:stCondLst>
+                                    <p:cond delay="0"/>
+                                  </p:stCondLst>
+                                  <p:childTnLst>
+                                    <p:set>
+                                      <p:cBhvr>
+                                        <p:cTn id="10" dur="1" fill="hold">
+                                          <p:stCondLst>
+                                            <p:cond delay="0"/>
+                                          </p:stCondLst>
+                                        </p:cTn>
+                                        <p:tgtEl>
+                                          <p:spTgt spid="4">
+                                            <p:txEl>
+                                              <p:pRg st="2" end="2"/>
+                                            </p:txEl>
+                                          </p:spTgt>
+                                        </p:tgtEl>
+                                        <p:attrNameLst>
+                                          <p:attrName>style.visibility</p:attrName>
+                                        </p:attrNameLst>
+                                      </p:cBhvr>
+                                      <p:to>
+                                        <p:strVal val="visible"/>
+                                      </p:to>
+                                    </p:set>
+                                  </p:childTnLst>
+                                </p:cTn>
+                              </p:par>
+                            </p:childTnLst>
+                          </p:cTn>
+                        </p:par>
+                      </p:childTnLst>
+                    </p:cTn>
+                  </p:par>
+                  <p:par>
+                    <p:cTn id="11" fill="hold">
+                      <p:stCondLst>
+                        <p:cond delay="indefinite"/>
+                      </p:stCondLst>
+                      <p:childTnLst>
+                        <p:par>
+                          <p:cTn id="12" fill="hold">
+                            <p:stCondLst>
+                              <p:cond delay="0"/>
+                            </p:stCondLst>
+                            <p:childTnLst>
+                              <p:par>
+                                <p:cTn id="13" presetID="1" presetClass="entr" presetSubtype="0" fill="hold" nodeType="clickEffect">
+                                  <p:stCondLst>
+                                    <p:cond delay="0"/>
+                                  </p:stCondLst>
+                                  <p:childTnLst>
+                                    <p:set>
+                                      <p:cBhvr>
+                                        <p:cTn id="14" dur="1" fill="hold">
+                                          <p:stCondLst>
+                                            <p:cond delay="0"/>
+                                          </p:stCondLst>
+                                        </p:cTn>
+                                        <p:tgtEl>
+                                          <p:spTgt spid="4">
+                                            <p:txEl>
+                                              <p:pRg st="4" end="4"/>
+                                            </p:txEl>
+                                          </p:spTgt>
+                                        </p:tgtEl>
+                                        <p:attrNameLst>
+                                          <p:attrName>style.visibility</p:attrName>
+                                        </p:attrNameLst>
+                                      </p:cBhvr>
+                                      <p:to>
+                                        <p:strVal val="visible"/>
+                                      </p:to>
+                                    </p:set>
+                                  </p:childTnLst>
+                                </p:cTn>
+                              </p:par>
+                            </p:childTnLst>
+                          </p:cTn>
+                        </p:par>
+                      </p:childTnLst>
+                    </p:cTn>
+                  </p:par>
+                  <p:par>
+                    <p:cTn id="15" fill="hold">
+                      <p:stCondLst>
+                        <p:cond delay="indefinite"/>
+                      </p:stCondLst>
+                      <p:childTnLst>
+                        <p:par>
+                          <p:cTn id="16" fill="hold">
+                            <p:stCondLst>
+                              <p:cond delay="0"/>
+                            </p:stCondLst>
+                            <p:childTnLst>
+                              <p:par>
+                                <p:cTn id="17" presetID="1" presetClass="entr" presetSubtype="0" fill="hold" nodeType="clickEffect">
+                                  <p:stCondLst>
+                                    <p:cond delay="0"/>
+                                  </p:stCondLst>
+                                  <p:childTnLst>
+                                    <p:set>
+                                      <p:cBhvr>
+                                        <p:cTn id="18" dur="1" fill="hold">
+                                          <p:stCondLst>
+                                            <p:cond delay="0"/>
+                                          </p:stCondLst>
+                                        </p:cTn>
+                                        <p:tgtEl>
+                                          <p:spTgt spid="4">
+                                            <p:txEl>
+                                              <p:pRg st="6" end="6"/>
+                                            </p:txEl>
+                                          </p:spTgt>
+                                        </p:tgtEl>
+                                        <p:attrNameLst>
+                                          <p:attrName>style.visibility</p:attrName>
+                                        </p:attrNameLst>
+                                      </p:cBhvr>
+                                      <p:to>
+                                        <p:strVal val="visible"/>
+                                      </p:to>
+                                    </p:set>
+                                  </p:childTnLst>
+                                </p:cTn>
+                              </p:par>
+                            </p:childTnLst>
+                          </p:cTn>
+                        </p:par>
+                      </p:childTnLst>
+                    </p:cTn>
+                  </p:par>
+                </p:childTnLst>
+              </p:cTn>
+              <p:prevCondLst>
+                <p:cond evt="onPrev" delay="0">
+                  <p:tgtEl>
+                    <p:sldTgt/>
+                  </p:tgtEl>
+                </p:cond>
+              </p:prevCondLst>
+              <p:nextCondLst>
+                <p:cond evt="onNext" delay="0">
+                  <p:tgtEl>
+                    <p:sldTgt/>
+                  </p:tgtEl>
+                </p:cond>
+              </p:nextCondLst>
+            </p:seq>
+          </p:childTnLst>
+        </p:cTn>
+      </p:par>
+    </p:tnLst>
+  </p:timing>
 </p:sld>
 </file>
 
@@ -3536,7 +4814,7 @@
         <p:spPr/>
         <p:txBody>
           <a:bodyPr>
-            <a:normAutofit lnSpcReduction="10000"/>
+            <a:normAutofit/>
           </a:bodyPr>
           <a:lstStyle/>
           <a:p>
@@ -3551,16 +4829,15 @@
           <a:p>
             <a:r>
               <a:rPr lang="en-US" dirty="0" smtClean="0"/>
-              <a:t>Each thread does its own thing, modifies its own packet.</a:t>
-            </a:r>
-          </a:p>
-          <a:p>
-            <a:endParaRPr lang="en-US" dirty="0"/>
-          </a:p>
-          <a:p>
-            <a:r>
-              <a:rPr lang="en-US" dirty="0" smtClean="0"/>
-              <a:t>Runs independent of all other threads.</a:t>
+              <a:t>Each thread </a:t>
+            </a:r>
+            <a:r>
+              <a:rPr lang="en-US" dirty="0" smtClean="0"/>
+              <a:t>is independent, does </a:t>
+            </a:r>
+            <a:r>
+              <a:rPr lang="en-US" dirty="0" smtClean="0"/>
+              <a:t>its own thing, modifies its own packet.</a:t>
             </a:r>
           </a:p>
           <a:p>
@@ -3601,6 +4878,232 @@
   <p:clrMapOvr>
     <a:masterClrMapping/>
   </p:clrMapOvr>
+  <p:timing>
+    <p:tnLst>
+      <p:par>
+        <p:cTn id="1" dur="indefinite" restart="never" nodeType="tmRoot">
+          <p:childTnLst>
+            <p:seq concurrent="1" nextAc="seek">
+              <p:cTn id="2" dur="indefinite" nodeType="mainSeq">
+                <p:childTnLst>
+                  <p:par>
+                    <p:cTn id="3" fill="hold">
+                      <p:stCondLst>
+                        <p:cond delay="indefinite"/>
+                      </p:stCondLst>
+                      <p:childTnLst>
+                        <p:par>
+                          <p:cTn id="4" fill="hold">
+                            <p:stCondLst>
+                              <p:cond delay="0"/>
+                            </p:stCondLst>
+                            <p:childTnLst>
+                              <p:par>
+                                <p:cTn id="5" presetID="1" presetClass="entr" presetSubtype="0" fill="hold" nodeType="clickEffect">
+                                  <p:stCondLst>
+                                    <p:cond delay="0"/>
+                                  </p:stCondLst>
+                                  <p:childTnLst>
+                                    <p:set>
+                                      <p:cBhvr>
+                                        <p:cTn id="6" dur="1" fill="hold">
+                                          <p:stCondLst>
+                                            <p:cond delay="0"/>
+                                          </p:stCondLst>
+                                        </p:cTn>
+                                        <p:tgtEl>
+                                          <p:spTgt spid="4">
+                                            <p:txEl>
+                                              <p:pRg st="0" end="0"/>
+                                            </p:txEl>
+                                          </p:spTgt>
+                                        </p:tgtEl>
+                                        <p:attrNameLst>
+                                          <p:attrName>style.visibility</p:attrName>
+                                        </p:attrNameLst>
+                                      </p:cBhvr>
+                                      <p:to>
+                                        <p:strVal val="visible"/>
+                                      </p:to>
+                                    </p:set>
+                                  </p:childTnLst>
+                                </p:cTn>
+                              </p:par>
+                            </p:childTnLst>
+                          </p:cTn>
+                        </p:par>
+                      </p:childTnLst>
+                    </p:cTn>
+                  </p:par>
+                  <p:par>
+                    <p:cTn id="7" fill="hold">
+                      <p:stCondLst>
+                        <p:cond delay="indefinite"/>
+                      </p:stCondLst>
+                      <p:childTnLst>
+                        <p:par>
+                          <p:cTn id="8" fill="hold">
+                            <p:stCondLst>
+                              <p:cond delay="0"/>
+                            </p:stCondLst>
+                            <p:childTnLst>
+                              <p:par>
+                                <p:cTn id="9" presetID="1" presetClass="entr" presetSubtype="0" fill="hold" nodeType="clickEffect">
+                                  <p:stCondLst>
+                                    <p:cond delay="0"/>
+                                  </p:stCondLst>
+                                  <p:childTnLst>
+                                    <p:set>
+                                      <p:cBhvr>
+                                        <p:cTn id="10" dur="1" fill="hold">
+                                          <p:stCondLst>
+                                            <p:cond delay="0"/>
+                                          </p:stCondLst>
+                                        </p:cTn>
+                                        <p:tgtEl>
+                                          <p:spTgt spid="4">
+                                            <p:txEl>
+                                              <p:pRg st="2" end="2"/>
+                                            </p:txEl>
+                                          </p:spTgt>
+                                        </p:tgtEl>
+                                        <p:attrNameLst>
+                                          <p:attrName>style.visibility</p:attrName>
+                                        </p:attrNameLst>
+                                      </p:cBhvr>
+                                      <p:to>
+                                        <p:strVal val="visible"/>
+                                      </p:to>
+                                    </p:set>
+                                  </p:childTnLst>
+                                </p:cTn>
+                              </p:par>
+                            </p:childTnLst>
+                          </p:cTn>
+                        </p:par>
+                      </p:childTnLst>
+                    </p:cTn>
+                  </p:par>
+                  <p:par>
+                    <p:cTn id="11" fill="hold">
+                      <p:stCondLst>
+                        <p:cond delay="indefinite"/>
+                      </p:stCondLst>
+                      <p:childTnLst>
+                        <p:par>
+                          <p:cTn id="12" fill="hold">
+                            <p:stCondLst>
+                              <p:cond delay="0"/>
+                            </p:stCondLst>
+                            <p:childTnLst>
+                              <p:par>
+                                <p:cTn id="13" presetID="1" presetClass="entr" presetSubtype="0" fill="hold" nodeType="clickEffect">
+                                  <p:stCondLst>
+                                    <p:cond delay="0"/>
+                                  </p:stCondLst>
+                                  <p:childTnLst>
+                                    <p:set>
+                                      <p:cBhvr>
+                                        <p:cTn id="14" dur="1" fill="hold">
+                                          <p:stCondLst>
+                                            <p:cond delay="0"/>
+                                          </p:stCondLst>
+                                        </p:cTn>
+                                        <p:tgtEl>
+                                          <p:spTgt spid="4">
+                                            <p:txEl>
+                                              <p:pRg st="4" end="4"/>
+                                            </p:txEl>
+                                          </p:spTgt>
+                                        </p:tgtEl>
+                                        <p:attrNameLst>
+                                          <p:attrName>style.visibility</p:attrName>
+                                        </p:attrNameLst>
+                                      </p:cBhvr>
+                                      <p:to>
+                                        <p:strVal val="visible"/>
+                                      </p:to>
+                                    </p:set>
+                                  </p:childTnLst>
+                                </p:cTn>
+                              </p:par>
+                            </p:childTnLst>
+                          </p:cTn>
+                        </p:par>
+                      </p:childTnLst>
+                    </p:cTn>
+                  </p:par>
+                  <p:par>
+                    <p:cTn id="15" fill="hold">
+                      <p:stCondLst>
+                        <p:cond delay="indefinite"/>
+                      </p:stCondLst>
+                      <p:childTnLst>
+                        <p:par>
+                          <p:cTn id="16" fill="hold">
+                            <p:stCondLst>
+                              <p:cond delay="0"/>
+                            </p:stCondLst>
+                            <p:childTnLst>
+                              <p:par>
+                                <p:cTn id="17" presetID="1" presetClass="entr" presetSubtype="0" fill="hold" nodeType="clickEffect">
+                                  <p:stCondLst>
+                                    <p:cond delay="0"/>
+                                  </p:stCondLst>
+                                  <p:childTnLst>
+                                    <p:set>
+                                      <p:cBhvr>
+                                        <p:cTn id="18" dur="1" fill="hold">
+                                          <p:stCondLst>
+                                            <p:cond delay="0"/>
+                                          </p:stCondLst>
+                                        </p:cTn>
+                                        <p:tgtEl>
+                                          <p:spTgt spid="4">
+                                            <p:txEl>
+                                              <p:pRg st="6" end="6"/>
+                                            </p:txEl>
+                                          </p:spTgt>
+                                        </p:tgtEl>
+                                        <p:attrNameLst>
+                                          <p:attrName>style.visibility</p:attrName>
+                                        </p:attrNameLst>
+                                      </p:cBhvr>
+                                      <p:to>
+                                        <p:strVal val="visible"/>
+                                      </p:to>
+                                    </p:set>
+                                  </p:childTnLst>
+                                </p:cTn>
+                              </p:par>
+                            </p:childTnLst>
+                          </p:cTn>
+                        </p:par>
+                      </p:childTnLst>
+                    </p:cTn>
+                  </p:par>
+                </p:childTnLst>
+              </p:cTn>
+              <p:prevCondLst>
+                <p:cond evt="onPrev" delay="0">
+                  <p:tgtEl>
+                    <p:sldTgt/>
+                  </p:tgtEl>
+                </p:cond>
+              </p:prevCondLst>
+              <p:nextCondLst>
+                <p:cond evt="onNext" delay="0">
+                  <p:tgtEl>
+                    <p:sldTgt/>
+                  </p:tgtEl>
+                </p:cond>
+              </p:nextCondLst>
+            </p:seq>
+          </p:childTnLst>
+        </p:cTn>
+      </p:par>
+    </p:tnLst>
+  </p:timing>
 </p:sld>
 </file>
 
@@ -3661,22 +5164,21 @@
         <p:spPr/>
         <p:txBody>
           <a:bodyPr>
-            <a:normAutofit lnSpcReduction="10000"/>
+            <a:normAutofit/>
           </a:bodyPr>
           <a:lstStyle/>
           <a:p>
             <a:r>
               <a:rPr lang="en-US" dirty="0" smtClean="0"/>
-              <a:t>One thread reads state, another writes it.</a:t>
-            </a:r>
-          </a:p>
-          <a:p>
-            <a:endParaRPr lang="en-US" dirty="0"/>
-          </a:p>
-          <a:p>
-            <a:r>
-              <a:rPr lang="en-US" dirty="0" smtClean="0"/>
-              <a:t>Classic race condition.</a:t>
+              <a:t>One thread reads state, another writes </a:t>
+            </a:r>
+            <a:r>
+              <a:rPr lang="en-US" dirty="0" smtClean="0"/>
+              <a:t>it, classic </a:t>
+            </a:r>
+            <a:r>
+              <a:rPr lang="en-US" dirty="0" smtClean="0"/>
+              <a:t>race condition.</a:t>
             </a:r>
           </a:p>
           <a:p>
@@ -3788,6 +5290,276 @@
   <p:clrMapOvr>
     <a:masterClrMapping/>
   </p:clrMapOvr>
+  <p:timing>
+    <p:tnLst>
+      <p:par>
+        <p:cTn id="1" dur="indefinite" restart="never" nodeType="tmRoot">
+          <p:childTnLst>
+            <p:seq concurrent="1" nextAc="seek">
+              <p:cTn id="2" dur="indefinite" nodeType="mainSeq">
+                <p:childTnLst>
+                  <p:par>
+                    <p:cTn id="3" fill="hold">
+                      <p:stCondLst>
+                        <p:cond delay="indefinite"/>
+                      </p:stCondLst>
+                      <p:childTnLst>
+                        <p:par>
+                          <p:cTn id="4" fill="hold">
+                            <p:stCondLst>
+                              <p:cond delay="0"/>
+                            </p:stCondLst>
+                            <p:childTnLst>
+                              <p:par>
+                                <p:cTn id="5" presetID="1" presetClass="entr" presetSubtype="0" fill="hold" nodeType="clickEffect">
+                                  <p:stCondLst>
+                                    <p:cond delay="0"/>
+                                  </p:stCondLst>
+                                  <p:childTnLst>
+                                    <p:set>
+                                      <p:cBhvr>
+                                        <p:cTn id="6" dur="1" fill="hold">
+                                          <p:stCondLst>
+                                            <p:cond delay="0"/>
+                                          </p:stCondLst>
+                                        </p:cTn>
+                                        <p:tgtEl>
+                                          <p:spTgt spid="4">
+                                            <p:txEl>
+                                              <p:pRg st="0" end="0"/>
+                                            </p:txEl>
+                                          </p:spTgt>
+                                        </p:tgtEl>
+                                        <p:attrNameLst>
+                                          <p:attrName>style.visibility</p:attrName>
+                                        </p:attrNameLst>
+                                      </p:cBhvr>
+                                      <p:to>
+                                        <p:strVal val="visible"/>
+                                      </p:to>
+                                    </p:set>
+                                  </p:childTnLst>
+                                </p:cTn>
+                              </p:par>
+                            </p:childTnLst>
+                          </p:cTn>
+                        </p:par>
+                      </p:childTnLst>
+                    </p:cTn>
+                  </p:par>
+                  <p:par>
+                    <p:cTn id="7" fill="hold">
+                      <p:stCondLst>
+                        <p:cond delay="indefinite"/>
+                      </p:stCondLst>
+                      <p:childTnLst>
+                        <p:par>
+                          <p:cTn id="8" fill="hold">
+                            <p:stCondLst>
+                              <p:cond delay="0"/>
+                            </p:stCondLst>
+                            <p:childTnLst>
+                              <p:par>
+                                <p:cTn id="9" presetID="1" presetClass="entr" presetSubtype="0" fill="hold" nodeType="clickEffect">
+                                  <p:stCondLst>
+                                    <p:cond delay="0"/>
+                                  </p:stCondLst>
+                                  <p:childTnLst>
+                                    <p:set>
+                                      <p:cBhvr>
+                                        <p:cTn id="10" dur="1" fill="hold">
+                                          <p:stCondLst>
+                                            <p:cond delay="0"/>
+                                          </p:stCondLst>
+                                        </p:cTn>
+                                        <p:tgtEl>
+                                          <p:spTgt spid="4">
+                                            <p:txEl>
+                                              <p:pRg st="2" end="2"/>
+                                            </p:txEl>
+                                          </p:spTgt>
+                                        </p:tgtEl>
+                                        <p:attrNameLst>
+                                          <p:attrName>style.visibility</p:attrName>
+                                        </p:attrNameLst>
+                                      </p:cBhvr>
+                                      <p:to>
+                                        <p:strVal val="visible"/>
+                                      </p:to>
+                                    </p:set>
+                                  </p:childTnLst>
+                                </p:cTn>
+                              </p:par>
+                              <p:par>
+                                <p:cTn id="11" presetID="1" presetClass="entr" presetSubtype="0" fill="hold" nodeType="withEffect">
+                                  <p:stCondLst>
+                                    <p:cond delay="0"/>
+                                  </p:stCondLst>
+                                  <p:childTnLst>
+                                    <p:set>
+                                      <p:cBhvr>
+                                        <p:cTn id="12" dur="1" fill="hold">
+                                          <p:stCondLst>
+                                            <p:cond delay="0"/>
+                                          </p:stCondLst>
+                                        </p:cTn>
+                                        <p:tgtEl>
+                                          <p:spTgt spid="4">
+                                            <p:txEl>
+                                              <p:pRg st="3" end="3"/>
+                                            </p:txEl>
+                                          </p:spTgt>
+                                        </p:tgtEl>
+                                        <p:attrNameLst>
+                                          <p:attrName>style.visibility</p:attrName>
+                                        </p:attrNameLst>
+                                      </p:cBhvr>
+                                      <p:to>
+                                        <p:strVal val="visible"/>
+                                      </p:to>
+                                    </p:set>
+                                  </p:childTnLst>
+                                </p:cTn>
+                              </p:par>
+                              <p:par>
+                                <p:cTn id="13" presetID="1" presetClass="entr" presetSubtype="0" fill="hold" nodeType="withEffect">
+                                  <p:stCondLst>
+                                    <p:cond delay="0"/>
+                                  </p:stCondLst>
+                                  <p:childTnLst>
+                                    <p:set>
+                                      <p:cBhvr>
+                                        <p:cTn id="14" dur="1" fill="hold">
+                                          <p:stCondLst>
+                                            <p:cond delay="0"/>
+                                          </p:stCondLst>
+                                        </p:cTn>
+                                        <p:tgtEl>
+                                          <p:spTgt spid="4">
+                                            <p:txEl>
+                                              <p:pRg st="4" end="4"/>
+                                            </p:txEl>
+                                          </p:spTgt>
+                                        </p:tgtEl>
+                                        <p:attrNameLst>
+                                          <p:attrName>style.visibility</p:attrName>
+                                        </p:attrNameLst>
+                                      </p:cBhvr>
+                                      <p:to>
+                                        <p:strVal val="visible"/>
+                                      </p:to>
+                                    </p:set>
+                                  </p:childTnLst>
+                                </p:cTn>
+                              </p:par>
+                              <p:par>
+                                <p:cTn id="15" presetID="1" presetClass="entr" presetSubtype="0" fill="hold" nodeType="withEffect">
+                                  <p:stCondLst>
+                                    <p:cond delay="0"/>
+                                  </p:stCondLst>
+                                  <p:childTnLst>
+                                    <p:set>
+                                      <p:cBhvr>
+                                        <p:cTn id="16" dur="1" fill="hold">
+                                          <p:stCondLst>
+                                            <p:cond delay="0"/>
+                                          </p:stCondLst>
+                                        </p:cTn>
+                                        <p:tgtEl>
+                                          <p:spTgt spid="4">
+                                            <p:txEl>
+                                              <p:pRg st="5" end="5"/>
+                                            </p:txEl>
+                                          </p:spTgt>
+                                        </p:tgtEl>
+                                        <p:attrNameLst>
+                                          <p:attrName>style.visibility</p:attrName>
+                                        </p:attrNameLst>
+                                      </p:cBhvr>
+                                      <p:to>
+                                        <p:strVal val="visible"/>
+                                      </p:to>
+                                    </p:set>
+                                  </p:childTnLst>
+                                </p:cTn>
+                              </p:par>
+                            </p:childTnLst>
+                          </p:cTn>
+                        </p:par>
+                      </p:childTnLst>
+                    </p:cTn>
+                  </p:par>
+                  <p:par>
+                    <p:cTn id="17" fill="hold">
+                      <p:stCondLst>
+                        <p:cond delay="indefinite"/>
+                      </p:stCondLst>
+                      <p:childTnLst>
+                        <p:par>
+                          <p:cTn id="18" fill="hold">
+                            <p:stCondLst>
+                              <p:cond delay="0"/>
+                            </p:stCondLst>
+                            <p:childTnLst>
+                              <p:par>
+                                <p:cTn id="19" presetID="1" presetClass="entr" presetSubtype="0" fill="hold" nodeType="clickEffect">
+                                  <p:stCondLst>
+                                    <p:cond delay="0"/>
+                                  </p:stCondLst>
+                                  <p:childTnLst>
+                                    <p:set>
+                                      <p:cBhvr>
+                                        <p:cTn id="20" dur="1" fill="hold">
+                                          <p:stCondLst>
+                                            <p:cond delay="0"/>
+                                          </p:stCondLst>
+                                        </p:cTn>
+                                        <p:tgtEl>
+                                          <p:spTgt spid="4">
+                                            <p:txEl>
+                                              <p:pRg st="7" end="7"/>
+                                            </p:txEl>
+                                          </p:spTgt>
+                                        </p:tgtEl>
+                                        <p:attrNameLst>
+                                          <p:attrName>style.visibility</p:attrName>
+                                        </p:attrNameLst>
+                                      </p:cBhvr>
+                                      <p:to>
+                                        <p:strVal val="visible"/>
+                                      </p:to>
+                                    </p:set>
+                                  </p:childTnLst>
+                                </p:cTn>
+                              </p:par>
+                            </p:childTnLst>
+                          </p:cTn>
+                        </p:par>
+                      </p:childTnLst>
+                    </p:cTn>
+                  </p:par>
+                </p:childTnLst>
+              </p:cTn>
+              <p:prevCondLst>
+                <p:cond evt="onPrev" delay="0">
+                  <p:tgtEl>
+                    <p:sldTgt/>
+                  </p:tgtEl>
+                </p:cond>
+              </p:prevCondLst>
+              <p:nextCondLst>
+                <p:cond evt="onNext" delay="0">
+                  <p:tgtEl>
+                    <p:sldTgt/>
+                  </p:tgtEl>
+                </p:cond>
+              </p:nextCondLst>
+            </p:seq>
+          </p:childTnLst>
+        </p:cTn>
+      </p:par>
+    </p:tnLst>
+  </p:timing>
 </p:sld>
 </file>
 
@@ -3848,7 +5620,7 @@
         <p:spPr/>
         <p:txBody>
           <a:bodyPr>
-            <a:normAutofit/>
+            <a:noAutofit/>
           </a:bodyPr>
           <a:lstStyle/>
           <a:p>
@@ -3857,18 +5629,125 @@
               <a:t>Flowlet</a:t>
             </a:r>
             <a:r>
-              <a:rPr lang="en-US" dirty="0" smtClean="0"/>
-              <a:t> switching (insert example code)</a:t>
-            </a:r>
-          </a:p>
-          <a:p>
+              <a:rPr lang="en-US" dirty="0"/>
+              <a:t> switching </a:t>
+            </a:r>
+            <a:r>
+              <a:rPr lang="en-US" dirty="0">
+                <a:hlinkClick r:id="rId2"/>
+              </a:rPr>
+              <a:t>(https://</a:t>
+            </a:r>
+            <a:r>
+              <a:rPr lang="en-US" dirty="0" smtClean="0">
+                <a:hlinkClick r:id="rId2"/>
+              </a:rPr>
+              <a:t>github.com/p4lang/p4c/blob/master/testdata/p4_14_samples_outputs/flowlet_switching.p4#L198)</a:t>
+            </a:r>
             <a:endParaRPr lang="en-US" dirty="0"/>
           </a:p>
           <a:p>
-            <a:r>
-              <a:rPr lang="en-US" dirty="0" smtClean="0"/>
-              <a:t>Parser checksum handling (insert example code)</a:t>
-            </a:r>
+            <a:pPr marL="0" indent="0">
+              <a:buNone/>
+            </a:pPr>
+            <a:r>
+              <a:rPr lang="en-US" dirty="0"/>
+              <a:t>	        </a:t>
+            </a:r>
+            <a:r>
+              <a:rPr lang="en-US" dirty="0" err="1"/>
+              <a:t>flowlet.apply</a:t>
+            </a:r>
+            <a:r>
+              <a:rPr lang="en-US" dirty="0"/>
+              <a:t>();	</a:t>
+            </a:r>
+          </a:p>
+          <a:p>
+            <a:pPr marL="0" indent="0">
+              <a:buNone/>
+            </a:pPr>
+            <a:r>
+              <a:rPr lang="en-US" dirty="0"/>
+              <a:t>	        if (</a:t>
+            </a:r>
+            <a:r>
+              <a:rPr lang="en-US" dirty="0" err="1"/>
+              <a:t>meta.ingress_metadata.flow_ipg</a:t>
+            </a:r>
+            <a:r>
+              <a:rPr lang="en-US" dirty="0"/>
+              <a:t> &gt; 32w50000) {	</a:t>
+            </a:r>
+          </a:p>
+          <a:p>
+            <a:pPr marL="0" indent="0">
+              <a:buNone/>
+            </a:pPr>
+            <a:r>
+              <a:rPr lang="en-US" dirty="0"/>
+              <a:t>	            </a:t>
+            </a:r>
+            <a:r>
+              <a:rPr lang="en-US" dirty="0" err="1"/>
+              <a:t>new_flowlet.apply</a:t>
+            </a:r>
+            <a:r>
+              <a:rPr lang="en-US" dirty="0"/>
+              <a:t>();	</a:t>
+            </a:r>
+          </a:p>
+          <a:p>
+            <a:pPr marL="0" indent="0">
+              <a:buNone/>
+            </a:pPr>
+            <a:r>
+              <a:rPr lang="de-DE" dirty="0"/>
+              <a:t>	        }	</a:t>
+            </a:r>
+          </a:p>
+          <a:p>
+            <a:r>
+              <a:rPr lang="de-DE" dirty="0" err="1" smtClean="0"/>
+              <a:t>flowlet_id</a:t>
+            </a:r>
+            <a:r>
+              <a:rPr lang="de-DE" dirty="0" smtClean="0"/>
+              <a:t> </a:t>
+            </a:r>
+            <a:r>
+              <a:rPr lang="de-DE" dirty="0" err="1" smtClean="0"/>
+              <a:t>read</a:t>
+            </a:r>
+            <a:r>
+              <a:rPr lang="de-DE" dirty="0" smtClean="0"/>
+              <a:t> in </a:t>
+            </a:r>
+            <a:r>
+              <a:rPr lang="de-DE" dirty="0" err="1" smtClean="0"/>
+              <a:t>flowlet.apply</a:t>
+            </a:r>
+            <a:r>
+              <a:rPr lang="de-DE" dirty="0" smtClean="0"/>
+              <a:t>(), </a:t>
+            </a:r>
+            <a:r>
+              <a:rPr lang="de-DE" dirty="0" err="1" smtClean="0"/>
+              <a:t>written</a:t>
+            </a:r>
+            <a:r>
+              <a:rPr lang="de-DE" dirty="0" smtClean="0"/>
+              <a:t> in </a:t>
+            </a:r>
+            <a:r>
+              <a:rPr lang="de-DE" dirty="0" err="1" smtClean="0"/>
+              <a:t>new_flowlet.apply</a:t>
+            </a:r>
+            <a:r>
+              <a:rPr lang="de-DE" dirty="0" smtClean="0"/>
+              <a:t>()</a:t>
+            </a:r>
+            <a:endParaRPr lang="de-DE" dirty="0"/>
           </a:p>
         </p:txBody>
       </p:sp>
@@ -3882,6 +5761,258 @@
   <p:clrMapOvr>
     <a:masterClrMapping/>
   </p:clrMapOvr>
+  <p:timing>
+    <p:tnLst>
+      <p:par>
+        <p:cTn id="1" dur="indefinite" restart="never" nodeType="tmRoot">
+          <p:childTnLst>
+            <p:seq concurrent="1" nextAc="seek">
+              <p:cTn id="2" dur="indefinite" nodeType="mainSeq">
+                <p:childTnLst>
+                  <p:par>
+                    <p:cTn id="3" fill="hold">
+                      <p:stCondLst>
+                        <p:cond delay="indefinite"/>
+                      </p:stCondLst>
+                      <p:childTnLst>
+                        <p:par>
+                          <p:cTn id="4" fill="hold">
+                            <p:stCondLst>
+                              <p:cond delay="0"/>
+                            </p:stCondLst>
+                            <p:childTnLst>
+                              <p:par>
+                                <p:cTn id="5" presetID="1" presetClass="entr" presetSubtype="0" fill="hold" nodeType="clickEffect">
+                                  <p:stCondLst>
+                                    <p:cond delay="0"/>
+                                  </p:stCondLst>
+                                  <p:childTnLst>
+                                    <p:set>
+                                      <p:cBhvr>
+                                        <p:cTn id="6" dur="1" fill="hold">
+                                          <p:stCondLst>
+                                            <p:cond delay="0"/>
+                                          </p:stCondLst>
+                                        </p:cTn>
+                                        <p:tgtEl>
+                                          <p:spTgt spid="4">
+                                            <p:txEl>
+                                              <p:pRg st="0" end="0"/>
+                                            </p:txEl>
+                                          </p:spTgt>
+                                        </p:tgtEl>
+                                        <p:attrNameLst>
+                                          <p:attrName>style.visibility</p:attrName>
+                                        </p:attrNameLst>
+                                      </p:cBhvr>
+                                      <p:to>
+                                        <p:strVal val="visible"/>
+                                      </p:to>
+                                    </p:set>
+                                  </p:childTnLst>
+                                </p:cTn>
+                              </p:par>
+                              <p:par>
+                                <p:cTn id="7" presetID="1" presetClass="entr" presetSubtype="0" fill="hold" nodeType="withEffect">
+                                  <p:stCondLst>
+                                    <p:cond delay="0"/>
+                                  </p:stCondLst>
+                                  <p:childTnLst>
+                                    <p:set>
+                                      <p:cBhvr>
+                                        <p:cTn id="8" dur="1" fill="hold">
+                                          <p:stCondLst>
+                                            <p:cond delay="0"/>
+                                          </p:stCondLst>
+                                        </p:cTn>
+                                        <p:tgtEl>
+                                          <p:spTgt spid="4">
+                                            <p:txEl>
+                                              <p:pRg st="1" end="1"/>
+                                            </p:txEl>
+                                          </p:spTgt>
+                                        </p:tgtEl>
+                                        <p:attrNameLst>
+                                          <p:attrName>style.visibility</p:attrName>
+                                        </p:attrNameLst>
+                                      </p:cBhvr>
+                                      <p:to>
+                                        <p:strVal val="visible"/>
+                                      </p:to>
+                                    </p:set>
+                                  </p:childTnLst>
+                                </p:cTn>
+                              </p:par>
+                              <p:par>
+                                <p:cTn id="9" presetID="1" presetClass="entr" presetSubtype="0" fill="hold" nodeType="withEffect">
+                                  <p:stCondLst>
+                                    <p:cond delay="0"/>
+                                  </p:stCondLst>
+                                  <p:childTnLst>
+                                    <p:set>
+                                      <p:cBhvr>
+                                        <p:cTn id="10" dur="1" fill="hold">
+                                          <p:stCondLst>
+                                            <p:cond delay="0"/>
+                                          </p:stCondLst>
+                                        </p:cTn>
+                                        <p:tgtEl>
+                                          <p:spTgt spid="4">
+                                            <p:txEl>
+                                              <p:pRg st="2" end="2"/>
+                                            </p:txEl>
+                                          </p:spTgt>
+                                        </p:tgtEl>
+                                        <p:attrNameLst>
+                                          <p:attrName>style.visibility</p:attrName>
+                                        </p:attrNameLst>
+                                      </p:cBhvr>
+                                      <p:to>
+                                        <p:strVal val="visible"/>
+                                      </p:to>
+                                    </p:set>
+                                  </p:childTnLst>
+                                </p:cTn>
+                              </p:par>
+                              <p:par>
+                                <p:cTn id="11" presetID="1" presetClass="entr" presetSubtype="0" fill="hold" nodeType="withEffect">
+                                  <p:stCondLst>
+                                    <p:cond delay="0"/>
+                                  </p:stCondLst>
+                                  <p:childTnLst>
+                                    <p:set>
+                                      <p:cBhvr>
+                                        <p:cTn id="12" dur="1" fill="hold">
+                                          <p:stCondLst>
+                                            <p:cond delay="0"/>
+                                          </p:stCondLst>
+                                        </p:cTn>
+                                        <p:tgtEl>
+                                          <p:spTgt spid="4">
+                                            <p:txEl>
+                                              <p:pRg st="3" end="3"/>
+                                            </p:txEl>
+                                          </p:spTgt>
+                                        </p:tgtEl>
+                                        <p:attrNameLst>
+                                          <p:attrName>style.visibility</p:attrName>
+                                        </p:attrNameLst>
+                                      </p:cBhvr>
+                                      <p:to>
+                                        <p:strVal val="visible"/>
+                                      </p:to>
+                                    </p:set>
+                                  </p:childTnLst>
+                                </p:cTn>
+                              </p:par>
+                              <p:par>
+                                <p:cTn id="13" presetID="1" presetClass="entr" presetSubtype="0" fill="hold" nodeType="withEffect">
+                                  <p:stCondLst>
+                                    <p:cond delay="0"/>
+                                  </p:stCondLst>
+                                  <p:childTnLst>
+                                    <p:set>
+                                      <p:cBhvr>
+                                        <p:cTn id="14" dur="1" fill="hold">
+                                          <p:stCondLst>
+                                            <p:cond delay="0"/>
+                                          </p:stCondLst>
+                                        </p:cTn>
+                                        <p:tgtEl>
+                                          <p:spTgt spid="4">
+                                            <p:txEl>
+                                              <p:pRg st="4" end="4"/>
+                                            </p:txEl>
+                                          </p:spTgt>
+                                        </p:tgtEl>
+                                        <p:attrNameLst>
+                                          <p:attrName>style.visibility</p:attrName>
+                                        </p:attrNameLst>
+                                      </p:cBhvr>
+                                      <p:to>
+                                        <p:strVal val="visible"/>
+                                      </p:to>
+                                    </p:set>
+                                  </p:childTnLst>
+                                </p:cTn>
+                              </p:par>
+                            </p:childTnLst>
+                          </p:cTn>
+                        </p:par>
+                      </p:childTnLst>
+                    </p:cTn>
+                  </p:par>
+                  <p:par>
+                    <p:cTn id="15" fill="hold">
+                      <p:stCondLst>
+                        <p:cond delay="indefinite"/>
+                      </p:stCondLst>
+                      <p:childTnLst>
+                        <p:par>
+                          <p:cTn id="16" fill="hold">
+                            <p:stCondLst>
+                              <p:cond delay="0"/>
+                            </p:stCondLst>
+                            <p:childTnLst>
+                              <p:par>
+                                <p:cTn id="17" presetID="1" presetClass="entr" presetSubtype="0" fill="hold" nodeType="clickEffect">
+                                  <p:stCondLst>
+                                    <p:cond delay="0"/>
+                                  </p:stCondLst>
+                                  <p:childTnLst>
+                                    <p:set>
+                                      <p:cBhvr>
+                                        <p:cTn id="18" dur="1" fill="hold">
+                                          <p:stCondLst>
+                                            <p:cond delay="0"/>
+                                          </p:stCondLst>
+                                        </p:cTn>
+                                        <p:tgtEl>
+                                          <p:spTgt spid="4">
+                                            <p:txEl>
+                                              <p:pRg st="5" end="5"/>
+                                            </p:txEl>
+                                          </p:spTgt>
+                                        </p:tgtEl>
+                                        <p:attrNameLst>
+                                          <p:attrName>style.visibility</p:attrName>
+                                        </p:attrNameLst>
+                                      </p:cBhvr>
+                                      <p:to>
+                                        <p:strVal val="visible"/>
+                                      </p:to>
+                                    </p:set>
+                                  </p:childTnLst>
+                                </p:cTn>
+                              </p:par>
+                            </p:childTnLst>
+                          </p:cTn>
+                        </p:par>
+                      </p:childTnLst>
+                    </p:cTn>
+                  </p:par>
+                </p:childTnLst>
+              </p:cTn>
+              <p:prevCondLst>
+                <p:cond evt="onPrev" delay="0">
+                  <p:tgtEl>
+                    <p:sldTgt/>
+                  </p:tgtEl>
+                </p:cond>
+              </p:prevCondLst>
+              <p:nextCondLst>
+                <p:cond evt="onNext" delay="0">
+                  <p:tgtEl>
+                    <p:sldTgt/>
+                  </p:tgtEl>
+                </p:cond>
+              </p:nextCondLst>
+            </p:seq>
+          </p:childTnLst>
+        </p:cTn>
+      </p:par>
+    </p:tnLst>
+  </p:timing>
 </p:sld>
 </file>
 
@@ -3919,7 +6050,7 @@
           <a:p>
             <a:r>
               <a:rPr lang="en-US" dirty="0" smtClean="0"/>
-              <a:t>How do we fix this?</a:t>
+              <a:t>Some real examples</a:t>
             </a:r>
             <a:endParaRPr lang="en-US" dirty="0">
               <a:latin typeface="Gadugi" charset="0"/>
@@ -3942,85 +6073,394 @@
         <p:spPr/>
         <p:txBody>
           <a:bodyPr>
-            <a:normAutofit/>
+            <a:noAutofit/>
           </a:bodyPr>
           <a:lstStyle/>
           <a:p>
             <a:r>
               <a:rPr lang="en-US" dirty="0" smtClean="0"/>
-              <a:t>Maybe increment is an atomic operation for the register?</a:t>
-            </a:r>
-          </a:p>
-          <a:p>
-            <a:endParaRPr lang="en-US" dirty="0"/>
-          </a:p>
-          <a:p>
-            <a:r>
-              <a:rPr lang="en-US" dirty="0" smtClean="0"/>
-              <a:t>But, P4 has no way to specify atomic operations.</a:t>
-            </a:r>
-          </a:p>
-          <a:p>
-            <a:endParaRPr lang="en-US" dirty="0"/>
-          </a:p>
-          <a:p>
-            <a:r>
-              <a:rPr lang="en-US" dirty="0" smtClean="0"/>
-              <a:t>But, more generally, what if you want to run more complicated atomic operations?</a:t>
-            </a:r>
-          </a:p>
-          <a:p>
-            <a:pPr lvl="1"/>
-            <a:r>
-              <a:rPr lang="en-US" dirty="0" smtClean="0"/>
-              <a:t>E.g., primitive actions within a compound action.</a:t>
-            </a:r>
-          </a:p>
-          <a:p>
+              <a:t>Checksums within a parser (</a:t>
+            </a:r>
+            <a:r>
+              <a:rPr lang="en-US" dirty="0" smtClean="0">
+                <a:hlinkClick r:id="rId2"/>
+              </a:rPr>
+              <a:t>https</a:t>
+            </a:r>
+            <a:r>
+              <a:rPr lang="en-US" dirty="0">
+                <a:hlinkClick r:id="rId2"/>
+              </a:rPr>
+              <a:t>://</a:t>
+            </a:r>
+            <a:r>
+              <a:rPr lang="en-US" dirty="0" smtClean="0">
+                <a:hlinkClick r:id="rId2"/>
+              </a:rPr>
+              <a:t>github.com/p4lang/p4c/blob/master/testdata/p4_16_samples/vss-example.p4#L87)</a:t>
+            </a:r>
             <a:endParaRPr lang="en-US" dirty="0" smtClean="0"/>
           </a:p>
           <a:p>
-            <a:r>
-              <a:rPr lang="en-US" dirty="0" smtClean="0"/>
-              <a:t>E.g., {</a:t>
-            </a:r>
-            <a:r>
-              <a:rPr lang="en-US" dirty="0" err="1" smtClean="0"/>
-              <a:t>pkt.cond</a:t>
-            </a:r>
-            <a:r>
-              <a:rPr lang="en-US" dirty="0" smtClean="0"/>
-              <a:t> = </a:t>
-            </a:r>
-            <a:r>
-              <a:rPr lang="en-US" dirty="0" err="1" smtClean="0"/>
-              <a:t>pkt.f</a:t>
-            </a:r>
-            <a:r>
-              <a:rPr lang="en-US" dirty="0" smtClean="0"/>
-              <a:t> == 5; x = x + (</a:t>
-            </a:r>
-            <a:r>
-              <a:rPr lang="en-US" dirty="0" err="1" smtClean="0"/>
-              <a:t>pkt.cond</a:t>
-            </a:r>
-            <a:r>
-              <a:rPr lang="en-US" dirty="0" smtClean="0"/>
-              <a:t> ? 1 : 0)};</a:t>
-            </a:r>
+            <a:pPr marL="0" indent="0">
+              <a:buNone/>
+            </a:pPr>
+            <a:r>
+              <a:rPr lang="en-US" dirty="0"/>
+              <a:t> </a:t>
+            </a:r>
+            <a:r>
+              <a:rPr lang="en-US" dirty="0" smtClean="0"/>
+              <a:t>         </a:t>
+            </a:r>
+            <a:r>
+              <a:rPr lang="ro-RO" dirty="0" err="1" smtClean="0"/>
+              <a:t>ck.clear</a:t>
+            </a:r>
+            <a:r>
+              <a:rPr lang="ro-RO" dirty="0"/>
+              <a:t>();		</a:t>
+            </a:r>
+          </a:p>
+          <a:p>
+            <a:pPr marL="0" indent="0">
+              <a:buNone/>
+            </a:pPr>
+            <a:r>
+              <a:rPr lang="ro-RO" dirty="0"/>
+              <a:t> </a:t>
+            </a:r>
+            <a:r>
+              <a:rPr lang="ro-RO" dirty="0" smtClean="0"/>
+              <a:t>         </a:t>
+            </a:r>
+            <a:r>
+              <a:rPr lang="ro-RO" dirty="0" err="1" smtClean="0"/>
+              <a:t>ck.update</a:t>
+            </a:r>
+            <a:r>
+              <a:rPr lang="ro-RO" dirty="0" smtClean="0"/>
+              <a:t>(</a:t>
+            </a:r>
+            <a:r>
+              <a:rPr lang="ro-RO" dirty="0" err="1" smtClean="0"/>
+              <a:t>p.ip</a:t>
+            </a:r>
+            <a:r>
+              <a:rPr lang="ro-RO" dirty="0"/>
+              <a:t>);	</a:t>
+            </a:r>
+          </a:p>
+          <a:p>
+            <a:pPr marL="0" indent="0">
+              <a:buNone/>
+            </a:pPr>
+            <a:r>
+              <a:rPr lang="ro-RO" dirty="0"/>
+              <a:t> </a:t>
+            </a:r>
+            <a:r>
+              <a:rPr lang="ro-RO" dirty="0" smtClean="0"/>
+              <a:t>         </a:t>
+            </a:r>
+            <a:r>
+              <a:rPr lang="ro-RO" dirty="0" err="1"/>
+              <a:t>verify</a:t>
+            </a:r>
+            <a:r>
+              <a:rPr lang="ro-RO" dirty="0"/>
+              <a:t>(</a:t>
+            </a:r>
+            <a:r>
+              <a:rPr lang="ro-RO" dirty="0" err="1"/>
+              <a:t>ck.get</a:t>
+            </a:r>
+            <a:r>
+              <a:rPr lang="ro-RO" dirty="0"/>
+              <a:t>() == 16w0, IPv4ChecksumError);	</a:t>
+            </a:r>
+            <a:endParaRPr lang="de-DE" dirty="0" smtClean="0"/>
+          </a:p>
+          <a:p>
+            <a:r>
+              <a:rPr lang="de-DE" dirty="0" err="1"/>
+              <a:t>c</a:t>
+            </a:r>
+            <a:r>
+              <a:rPr lang="de-DE" dirty="0" err="1" smtClean="0"/>
+              <a:t>k</a:t>
+            </a:r>
+            <a:r>
+              <a:rPr lang="de-DE" dirty="0" smtClean="0"/>
+              <a:t> </a:t>
+            </a:r>
+            <a:r>
+              <a:rPr lang="de-DE" dirty="0" err="1" smtClean="0"/>
+              <a:t>is</a:t>
+            </a:r>
+            <a:r>
+              <a:rPr lang="de-DE" dirty="0" smtClean="0"/>
+              <a:t> </a:t>
+            </a:r>
+            <a:r>
+              <a:rPr lang="de-DE" dirty="0" err="1" smtClean="0"/>
+              <a:t>read</a:t>
+            </a:r>
+            <a:r>
+              <a:rPr lang="de-DE" dirty="0" smtClean="0"/>
+              <a:t>/</a:t>
+            </a:r>
+            <a:r>
+              <a:rPr lang="de-DE" dirty="0" err="1" smtClean="0"/>
+              <a:t>written</a:t>
+            </a:r>
+            <a:r>
+              <a:rPr lang="de-DE" dirty="0" smtClean="0"/>
+              <a:t>, in multiple </a:t>
+            </a:r>
+            <a:r>
+              <a:rPr lang="de-DE" dirty="0" err="1" smtClean="0"/>
+              <a:t>steps</a:t>
+            </a:r>
+            <a:r>
+              <a:rPr lang="de-DE" dirty="0" smtClean="0"/>
+              <a:t>?</a:t>
+            </a:r>
+            <a:endParaRPr lang="de-DE" dirty="0"/>
           </a:p>
         </p:txBody>
       </p:sp>
     </p:spTree>
     <p:extLst>
       <p:ext uri="{BB962C8B-B14F-4D97-AF65-F5344CB8AC3E}">
-        <p14:creationId xmlns:p14="http://schemas.microsoft.com/office/powerpoint/2010/main" val="565232800"/>
+        <p14:creationId xmlns:p14="http://schemas.microsoft.com/office/powerpoint/2010/main" val="1830172520"/>
       </p:ext>
     </p:extLst>
   </p:cSld>
   <p:clrMapOvr>
     <a:masterClrMapping/>
   </p:clrMapOvr>
+  <p:timing>
+    <p:tnLst>
+      <p:par>
+        <p:cTn id="1" dur="indefinite" restart="never" nodeType="tmRoot">
+          <p:childTnLst>
+            <p:seq concurrent="1" nextAc="seek">
+              <p:cTn id="2" dur="indefinite" nodeType="mainSeq">
+                <p:childTnLst>
+                  <p:par>
+                    <p:cTn id="3" fill="hold">
+                      <p:stCondLst>
+                        <p:cond delay="indefinite"/>
+                      </p:stCondLst>
+                      <p:childTnLst>
+                        <p:par>
+                          <p:cTn id="4" fill="hold">
+                            <p:stCondLst>
+                              <p:cond delay="0"/>
+                            </p:stCondLst>
+                            <p:childTnLst>
+                              <p:par>
+                                <p:cTn id="5" presetID="1" presetClass="entr" presetSubtype="0" fill="hold" nodeType="clickEffect">
+                                  <p:stCondLst>
+                                    <p:cond delay="0"/>
+                                  </p:stCondLst>
+                                  <p:childTnLst>
+                                    <p:set>
+                                      <p:cBhvr>
+                                        <p:cTn id="6" dur="1" fill="hold">
+                                          <p:stCondLst>
+                                            <p:cond delay="0"/>
+                                          </p:stCondLst>
+                                        </p:cTn>
+                                        <p:tgtEl>
+                                          <p:spTgt spid="4">
+                                            <p:txEl>
+                                              <p:pRg st="0" end="0"/>
+                                            </p:txEl>
+                                          </p:spTgt>
+                                        </p:tgtEl>
+                                        <p:attrNameLst>
+                                          <p:attrName>style.visibility</p:attrName>
+                                        </p:attrNameLst>
+                                      </p:cBhvr>
+                                      <p:to>
+                                        <p:strVal val="visible"/>
+                                      </p:to>
+                                    </p:set>
+                                  </p:childTnLst>
+                                </p:cTn>
+                              </p:par>
+                              <p:par>
+                                <p:cTn id="7" presetID="1" presetClass="entr" presetSubtype="0" fill="hold" nodeType="withEffect">
+                                  <p:stCondLst>
+                                    <p:cond delay="0"/>
+                                  </p:stCondLst>
+                                  <p:childTnLst>
+                                    <p:set>
+                                      <p:cBhvr>
+                                        <p:cTn id="8" dur="1" fill="hold">
+                                          <p:stCondLst>
+                                            <p:cond delay="0"/>
+                                          </p:stCondLst>
+                                        </p:cTn>
+                                        <p:tgtEl>
+                                          <p:spTgt spid="4">
+                                            <p:txEl>
+                                              <p:pRg st="1" end="1"/>
+                                            </p:txEl>
+                                          </p:spTgt>
+                                        </p:tgtEl>
+                                        <p:attrNameLst>
+                                          <p:attrName>style.visibility</p:attrName>
+                                        </p:attrNameLst>
+                                      </p:cBhvr>
+                                      <p:to>
+                                        <p:strVal val="visible"/>
+                                      </p:to>
+                                    </p:set>
+                                  </p:childTnLst>
+                                </p:cTn>
+                              </p:par>
+                              <p:par>
+                                <p:cTn id="9" presetID="1" presetClass="entr" presetSubtype="0" fill="hold" nodeType="withEffect">
+                                  <p:stCondLst>
+                                    <p:cond delay="0"/>
+                                  </p:stCondLst>
+                                  <p:childTnLst>
+                                    <p:set>
+                                      <p:cBhvr>
+                                        <p:cTn id="10" dur="1" fill="hold">
+                                          <p:stCondLst>
+                                            <p:cond delay="0"/>
+                                          </p:stCondLst>
+                                        </p:cTn>
+                                        <p:tgtEl>
+                                          <p:spTgt spid="4">
+                                            <p:txEl>
+                                              <p:pRg st="2" end="2"/>
+                                            </p:txEl>
+                                          </p:spTgt>
+                                        </p:tgtEl>
+                                        <p:attrNameLst>
+                                          <p:attrName>style.visibility</p:attrName>
+                                        </p:attrNameLst>
+                                      </p:cBhvr>
+                                      <p:to>
+                                        <p:strVal val="visible"/>
+                                      </p:to>
+                                    </p:set>
+                                  </p:childTnLst>
+                                </p:cTn>
+                              </p:par>
+                              <p:par>
+                                <p:cTn id="11" presetID="1" presetClass="entr" presetSubtype="0" fill="hold" nodeType="withEffect">
+                                  <p:stCondLst>
+                                    <p:cond delay="0"/>
+                                  </p:stCondLst>
+                                  <p:childTnLst>
+                                    <p:set>
+                                      <p:cBhvr>
+                                        <p:cTn id="12" dur="1" fill="hold">
+                                          <p:stCondLst>
+                                            <p:cond delay="0"/>
+                                          </p:stCondLst>
+                                        </p:cTn>
+                                        <p:tgtEl>
+                                          <p:spTgt spid="4">
+                                            <p:txEl>
+                                              <p:pRg st="3" end="3"/>
+                                            </p:txEl>
+                                          </p:spTgt>
+                                        </p:tgtEl>
+                                        <p:attrNameLst>
+                                          <p:attrName>style.visibility</p:attrName>
+                                        </p:attrNameLst>
+                                      </p:cBhvr>
+                                      <p:to>
+                                        <p:strVal val="visible"/>
+                                      </p:to>
+                                    </p:set>
+                                  </p:childTnLst>
+                                </p:cTn>
+                              </p:par>
+                            </p:childTnLst>
+                          </p:cTn>
+                        </p:par>
+                      </p:childTnLst>
+                    </p:cTn>
+                  </p:par>
+                  <p:par>
+                    <p:cTn id="13" fill="hold">
+                      <p:stCondLst>
+                        <p:cond delay="indefinite"/>
+                      </p:stCondLst>
+                      <p:childTnLst>
+                        <p:par>
+                          <p:cTn id="14" fill="hold">
+                            <p:stCondLst>
+                              <p:cond delay="0"/>
+                            </p:stCondLst>
+                            <p:childTnLst>
+                              <p:par>
+                                <p:cTn id="15" presetID="1" presetClass="entr" presetSubtype="0" fill="hold" nodeType="clickEffect">
+                                  <p:stCondLst>
+                                    <p:cond delay="0"/>
+                                  </p:stCondLst>
+                                  <p:childTnLst>
+                                    <p:set>
+                                      <p:cBhvr>
+                                        <p:cTn id="16" dur="1" fill="hold">
+                                          <p:stCondLst>
+                                            <p:cond delay="0"/>
+                                          </p:stCondLst>
+                                        </p:cTn>
+                                        <p:tgtEl>
+                                          <p:spTgt spid="4">
+                                            <p:txEl>
+                                              <p:pRg st="4" end="4"/>
+                                            </p:txEl>
+                                          </p:spTgt>
+                                        </p:tgtEl>
+                                        <p:attrNameLst>
+                                          <p:attrName>style.visibility</p:attrName>
+                                        </p:attrNameLst>
+                                      </p:cBhvr>
+                                      <p:to>
+                                        <p:strVal val="visible"/>
+                                      </p:to>
+                                    </p:set>
+                                  </p:childTnLst>
+                                </p:cTn>
+                              </p:par>
+                            </p:childTnLst>
+                          </p:cTn>
+                        </p:par>
+                      </p:childTnLst>
+                    </p:cTn>
+                  </p:par>
+                </p:childTnLst>
+              </p:cTn>
+              <p:prevCondLst>
+                <p:cond evt="onPrev" delay="0">
+                  <p:tgtEl>
+                    <p:sldTgt/>
+                  </p:tgtEl>
+                </p:cond>
+              </p:prevCondLst>
+              <p:nextCondLst>
+                <p:cond evt="onNext" delay="0">
+                  <p:tgtEl>
+                    <p:sldTgt/>
+                  </p:tgtEl>
+                </p:cond>
+              </p:nextCondLst>
+            </p:seq>
+          </p:childTnLst>
+        </p:cTn>
+      </p:par>
+    </p:tnLst>
+  </p:timing>
 </p:sld>
 </file>
 
@@ -4058,7 +6498,7 @@
           <a:p>
             <a:r>
               <a:rPr lang="en-US" dirty="0" smtClean="0"/>
-              <a:t>A proposal</a:t>
+              <a:t>How do we fix this?</a:t>
             </a:r>
             <a:endParaRPr lang="en-US" dirty="0">
               <a:latin typeface="Gadugi" charset="0"/>
@@ -4081,103 +6521,317 @@
         <p:spPr/>
         <p:txBody>
           <a:bodyPr>
-            <a:normAutofit fontScale="92500"/>
+            <a:normAutofit/>
           </a:bodyPr>
           <a:lstStyle/>
           <a:p>
             <a:r>
               <a:rPr lang="en-US" dirty="0" smtClean="0"/>
-              <a:t>Surround P4 statements with an @atomic block.</a:t>
+              <a:t>Maybe increment is an atomic operation for the register?</a:t>
+            </a:r>
+          </a:p>
+          <a:p>
+            <a:endParaRPr lang="en-US" dirty="0"/>
+          </a:p>
+          <a:p>
+            <a:r>
+              <a:rPr lang="en-US" dirty="0" smtClean="0"/>
+              <a:t>But, P4 has no way to specify atomic operations.</a:t>
+            </a:r>
+          </a:p>
+          <a:p>
+            <a:endParaRPr lang="en-US" dirty="0"/>
+          </a:p>
+          <a:p>
+            <a:r>
+              <a:rPr lang="en-US" dirty="0" smtClean="0"/>
+              <a:t>But, more generally, what if you want to run more complicated atomic operations?</a:t>
             </a:r>
           </a:p>
           <a:p>
             <a:pPr lvl="1"/>
             <a:r>
               <a:rPr lang="en-US" dirty="0" smtClean="0"/>
-              <a:t>Ensures they are treated as one </a:t>
+              <a:t>{</a:t>
             </a:r>
             <a:r>
               <a:rPr lang="en-US" dirty="0" err="1" smtClean="0"/>
-              <a:t>indivisable</a:t>
-            </a:r>
-            <a:r>
-              <a:rPr lang="en-US" dirty="0" smtClean="0"/>
-              <a:t> unit.</a:t>
-            </a:r>
-          </a:p>
-          <a:p>
-            <a:pPr lvl="1"/>
-            <a:endParaRPr lang="en-US" dirty="0"/>
-          </a:p>
-          <a:p>
-            <a:r>
-              <a:rPr lang="en-US" dirty="0" smtClean="0"/>
-              <a:t>Special cases / Syntactic sugar.</a:t>
-            </a:r>
-          </a:p>
-          <a:p>
-            <a:pPr lvl="1"/>
-            <a:r>
-              <a:rPr lang="en-US" dirty="0" smtClean="0"/>
-              <a:t>Extern methods can be marked as atomic instead of rewriting method calls.</a:t>
-            </a:r>
-          </a:p>
-          <a:p>
-            <a:pPr lvl="1"/>
-            <a:r>
-              <a:rPr lang="en-US" dirty="0" smtClean="0"/>
-              <a:t>Action applications can be atomic by default instead of rewriting method calls.</a:t>
-            </a:r>
-          </a:p>
-          <a:p>
-            <a:pPr lvl="1"/>
-            <a:endParaRPr lang="en-US" dirty="0"/>
-          </a:p>
-          <a:p>
-            <a:r>
-              <a:rPr lang="en-US" dirty="0" smtClean="0"/>
-              <a:t>Some </a:t>
-            </a:r>
-            <a:r>
-              <a:rPr lang="en-US" dirty="0" smtClean="0"/>
-              <a:t>precedent:</a:t>
-            </a:r>
-          </a:p>
-          <a:p>
-            <a:pPr lvl="1"/>
-            <a:r>
-              <a:rPr lang="en-US" dirty="0" smtClean="0"/>
-              <a:t>C++ (_transaction)</a:t>
-            </a:r>
-          </a:p>
-          <a:p>
-            <a:pPr lvl="1"/>
-            <a:r>
-              <a:rPr lang="en-US" dirty="0" smtClean="0"/>
-              <a:t>Haskell </a:t>
-            </a:r>
-            <a:r>
-              <a:rPr lang="en-US" smtClean="0"/>
-              <a:t>(atomic)</a:t>
-            </a:r>
-            <a:endParaRPr lang="en-US" smtClean="0"/>
-          </a:p>
-          <a:p>
-            <a:pPr lvl="1"/>
-            <a:endParaRPr lang="en-US" dirty="0"/>
+              <a:t>pkt.cond</a:t>
+            </a:r>
+            <a:r>
+              <a:rPr lang="en-US" dirty="0" smtClean="0"/>
+              <a:t> </a:t>
+            </a:r>
+            <a:r>
+              <a:rPr lang="en-US" dirty="0" smtClean="0"/>
+              <a:t>= </a:t>
+            </a:r>
+            <a:r>
+              <a:rPr lang="en-US" dirty="0" err="1" smtClean="0"/>
+              <a:t>pkt.f</a:t>
+            </a:r>
+            <a:r>
+              <a:rPr lang="en-US" dirty="0" smtClean="0"/>
+              <a:t> == 5; x = </a:t>
+            </a:r>
+            <a:r>
+              <a:rPr lang="en-US" dirty="0" smtClean="0"/>
+              <a:t>(</a:t>
+            </a:r>
+            <a:r>
+              <a:rPr lang="en-US" dirty="0" err="1" smtClean="0"/>
+              <a:t>pkt.cond</a:t>
+            </a:r>
+            <a:r>
+              <a:rPr lang="en-US" dirty="0" smtClean="0"/>
+              <a:t> </a:t>
+            </a:r>
+            <a:r>
+              <a:rPr lang="en-US" dirty="0" smtClean="0"/>
+              <a:t>? </a:t>
+            </a:r>
+            <a:r>
+              <a:rPr lang="en-US" dirty="0" smtClean="0"/>
+              <a:t>y </a:t>
+            </a:r>
+            <a:r>
+              <a:rPr lang="en-US" dirty="0" smtClean="0"/>
+              <a:t>: 0</a:t>
+            </a:r>
+            <a:r>
+              <a:rPr lang="en-US" dirty="0" smtClean="0"/>
+              <a:t>)} for </a:t>
+            </a:r>
+            <a:r>
+              <a:rPr lang="en-US" dirty="0" err="1" smtClean="0"/>
+              <a:t>flowlet</a:t>
+            </a:r>
+            <a:r>
+              <a:rPr lang="en-US" dirty="0" smtClean="0"/>
+              <a:t> switching.</a:t>
+            </a:r>
+            <a:endParaRPr lang="en-US" dirty="0" smtClean="0"/>
           </a:p>
         </p:txBody>
       </p:sp>
     </p:spTree>
     <p:extLst>
       <p:ext uri="{BB962C8B-B14F-4D97-AF65-F5344CB8AC3E}">
-        <p14:creationId xmlns:p14="http://schemas.microsoft.com/office/powerpoint/2010/main" val="1526511764"/>
+        <p14:creationId xmlns:p14="http://schemas.microsoft.com/office/powerpoint/2010/main" val="565232800"/>
       </p:ext>
     </p:extLst>
   </p:cSld>
   <p:clrMapOvr>
     <a:masterClrMapping/>
   </p:clrMapOvr>
+  <p:timing>
+    <p:tnLst>
+      <p:par>
+        <p:cTn id="1" dur="indefinite" restart="never" nodeType="tmRoot">
+          <p:childTnLst>
+            <p:seq concurrent="1" nextAc="seek">
+              <p:cTn id="2" dur="indefinite" nodeType="mainSeq">
+                <p:childTnLst>
+                  <p:par>
+                    <p:cTn id="3" fill="hold">
+                      <p:stCondLst>
+                        <p:cond delay="indefinite"/>
+                      </p:stCondLst>
+                      <p:childTnLst>
+                        <p:par>
+                          <p:cTn id="4" fill="hold">
+                            <p:stCondLst>
+                              <p:cond delay="0"/>
+                            </p:stCondLst>
+                            <p:childTnLst>
+                              <p:par>
+                                <p:cTn id="5" presetID="1" presetClass="entr" presetSubtype="0" fill="hold" nodeType="clickEffect">
+                                  <p:stCondLst>
+                                    <p:cond delay="0"/>
+                                  </p:stCondLst>
+                                  <p:childTnLst>
+                                    <p:set>
+                                      <p:cBhvr>
+                                        <p:cTn id="6" dur="1" fill="hold">
+                                          <p:stCondLst>
+                                            <p:cond delay="0"/>
+                                          </p:stCondLst>
+                                        </p:cTn>
+                                        <p:tgtEl>
+                                          <p:spTgt spid="4">
+                                            <p:txEl>
+                                              <p:pRg st="0" end="0"/>
+                                            </p:txEl>
+                                          </p:spTgt>
+                                        </p:tgtEl>
+                                        <p:attrNameLst>
+                                          <p:attrName>style.visibility</p:attrName>
+                                        </p:attrNameLst>
+                                      </p:cBhvr>
+                                      <p:to>
+                                        <p:strVal val="visible"/>
+                                      </p:to>
+                                    </p:set>
+                                  </p:childTnLst>
+                                </p:cTn>
+                              </p:par>
+                            </p:childTnLst>
+                          </p:cTn>
+                        </p:par>
+                      </p:childTnLst>
+                    </p:cTn>
+                  </p:par>
+                  <p:par>
+                    <p:cTn id="7" fill="hold">
+                      <p:stCondLst>
+                        <p:cond delay="indefinite"/>
+                      </p:stCondLst>
+                      <p:childTnLst>
+                        <p:par>
+                          <p:cTn id="8" fill="hold">
+                            <p:stCondLst>
+                              <p:cond delay="0"/>
+                            </p:stCondLst>
+                            <p:childTnLst>
+                              <p:par>
+                                <p:cTn id="9" presetID="1" presetClass="entr" presetSubtype="0" fill="hold" nodeType="clickEffect">
+                                  <p:stCondLst>
+                                    <p:cond delay="0"/>
+                                  </p:stCondLst>
+                                  <p:childTnLst>
+                                    <p:set>
+                                      <p:cBhvr>
+                                        <p:cTn id="10" dur="1" fill="hold">
+                                          <p:stCondLst>
+                                            <p:cond delay="0"/>
+                                          </p:stCondLst>
+                                        </p:cTn>
+                                        <p:tgtEl>
+                                          <p:spTgt spid="4">
+                                            <p:txEl>
+                                              <p:pRg st="2" end="2"/>
+                                            </p:txEl>
+                                          </p:spTgt>
+                                        </p:tgtEl>
+                                        <p:attrNameLst>
+                                          <p:attrName>style.visibility</p:attrName>
+                                        </p:attrNameLst>
+                                      </p:cBhvr>
+                                      <p:to>
+                                        <p:strVal val="visible"/>
+                                      </p:to>
+                                    </p:set>
+                                  </p:childTnLst>
+                                </p:cTn>
+                              </p:par>
+                            </p:childTnLst>
+                          </p:cTn>
+                        </p:par>
+                      </p:childTnLst>
+                    </p:cTn>
+                  </p:par>
+                  <p:par>
+                    <p:cTn id="11" fill="hold">
+                      <p:stCondLst>
+                        <p:cond delay="indefinite"/>
+                      </p:stCondLst>
+                      <p:childTnLst>
+                        <p:par>
+                          <p:cTn id="12" fill="hold">
+                            <p:stCondLst>
+                              <p:cond delay="0"/>
+                            </p:stCondLst>
+                            <p:childTnLst>
+                              <p:par>
+                                <p:cTn id="13" presetID="1" presetClass="entr" presetSubtype="0" fill="hold" nodeType="clickEffect">
+                                  <p:stCondLst>
+                                    <p:cond delay="0"/>
+                                  </p:stCondLst>
+                                  <p:childTnLst>
+                                    <p:set>
+                                      <p:cBhvr>
+                                        <p:cTn id="14" dur="1" fill="hold">
+                                          <p:stCondLst>
+                                            <p:cond delay="0"/>
+                                          </p:stCondLst>
+                                        </p:cTn>
+                                        <p:tgtEl>
+                                          <p:spTgt spid="4">
+                                            <p:txEl>
+                                              <p:pRg st="4" end="4"/>
+                                            </p:txEl>
+                                          </p:spTgt>
+                                        </p:tgtEl>
+                                        <p:attrNameLst>
+                                          <p:attrName>style.visibility</p:attrName>
+                                        </p:attrNameLst>
+                                      </p:cBhvr>
+                                      <p:to>
+                                        <p:strVal val="visible"/>
+                                      </p:to>
+                                    </p:set>
+                                  </p:childTnLst>
+                                </p:cTn>
+                              </p:par>
+                              <p:par>
+                                <p:cTn id="15" presetID="1" presetClass="entr" presetSubtype="0" fill="hold" nodeType="withEffect">
+                                  <p:stCondLst>
+                                    <p:cond delay="0"/>
+                                  </p:stCondLst>
+                                  <p:childTnLst>
+                                    <p:set>
+                                      <p:cBhvr>
+                                        <p:cTn id="16" dur="1" fill="hold">
+                                          <p:stCondLst>
+                                            <p:cond delay="0"/>
+                                          </p:stCondLst>
+                                        </p:cTn>
+                                        <p:tgtEl>
+                                          <p:spTgt spid="4">
+                                            <p:txEl>
+                                              <p:pRg st="5" end="5"/>
+                                            </p:txEl>
+                                          </p:spTgt>
+                                        </p:tgtEl>
+                                        <p:attrNameLst>
+                                          <p:attrName>style.visibility</p:attrName>
+                                        </p:attrNameLst>
+                                      </p:cBhvr>
+                                      <p:to>
+                                        <p:strVal val="visible"/>
+                                      </p:to>
+                                    </p:set>
+                                  </p:childTnLst>
+                                </p:cTn>
+                              </p:par>
+                            </p:childTnLst>
+                          </p:cTn>
+                        </p:par>
+                      </p:childTnLst>
+                    </p:cTn>
+                  </p:par>
+                </p:childTnLst>
+              </p:cTn>
+              <p:prevCondLst>
+                <p:cond evt="onPrev" delay="0">
+                  <p:tgtEl>
+                    <p:sldTgt/>
+                  </p:tgtEl>
+                </p:cond>
+              </p:prevCondLst>
+              <p:nextCondLst>
+                <p:cond evt="onNext" delay="0">
+                  <p:tgtEl>
+                    <p:sldTgt/>
+                  </p:tgtEl>
+                </p:cond>
+              </p:nextCondLst>
+            </p:seq>
+          </p:childTnLst>
+        </p:cTn>
+      </p:par>
+    </p:tnLst>
+  </p:timing>
 </p:sld>
 </file>
 
@@ -4215,7 +6869,7 @@
           <a:p>
             <a:r>
               <a:rPr lang="en-US" dirty="0" smtClean="0"/>
-              <a:t>Compiling atomics</a:t>
+              <a:t>A proposal</a:t>
             </a:r>
             <a:endParaRPr lang="en-US" dirty="0">
               <a:latin typeface="Gadugi" charset="0"/>
@@ -4238,37 +6892,109 @@
         <p:spPr/>
         <p:txBody>
           <a:bodyPr>
-            <a:normAutofit/>
+            <a:normAutofit lnSpcReduction="10000"/>
           </a:bodyPr>
           <a:lstStyle/>
           <a:p>
             <a:r>
               <a:rPr lang="en-US" dirty="0" smtClean="0"/>
-              <a:t>The naïve solution: One big lock</a:t>
-            </a:r>
-          </a:p>
-          <a:p>
+              <a:t>Surround P4 statements with an @atomic block.</a:t>
+            </a:r>
+          </a:p>
+          <a:p>
+            <a:pPr lvl="1"/>
+            <a:r>
+              <a:rPr lang="en-US" dirty="0" smtClean="0"/>
+              <a:t>Ensures they are treated as one </a:t>
+            </a:r>
+            <a:r>
+              <a:rPr lang="en-US" dirty="0" err="1" smtClean="0"/>
+              <a:t>indivisable</a:t>
+            </a:r>
+            <a:r>
+              <a:rPr lang="en-US" dirty="0" smtClean="0"/>
+              <a:t> unit.</a:t>
+            </a:r>
+          </a:p>
+          <a:p>
+            <a:pPr lvl="1"/>
             <a:endParaRPr lang="en-US" dirty="0"/>
           </a:p>
           <a:p>
             <a:r>
               <a:rPr lang="en-US" dirty="0" smtClean="0"/>
-              <a:t>Slightly smarter solution: Identify the portions that really need to be atomic and use smaller locks. (give an example)</a:t>
-            </a:r>
-          </a:p>
-          <a:p>
-            <a:endParaRPr lang="en-US" dirty="0"/>
-          </a:p>
-          <a:p>
-            <a:r>
-              <a:rPr lang="en-US" dirty="0" smtClean="0"/>
-              <a:t>Try and map atomic sections to dedicated hardware atomic instructions; reject code if not possible.</a:t>
-            </a:r>
-          </a:p>
-          <a:p>
-            <a:endParaRPr lang="en-US" dirty="0"/>
-          </a:p>
-          <a:p>
+              <a:t>Some precedent:</a:t>
+            </a:r>
+          </a:p>
+          <a:p>
+            <a:pPr lvl="1"/>
+            <a:r>
+              <a:rPr lang="en-US" dirty="0" smtClean="0"/>
+              <a:t>C++ (_</a:t>
+            </a:r>
+            <a:r>
+              <a:rPr lang="en-US" dirty="0" err="1" smtClean="0"/>
+              <a:t>transaction_atomic</a:t>
+            </a:r>
+            <a:r>
+              <a:rPr lang="en-US" dirty="0" smtClean="0"/>
+              <a:t>)</a:t>
+            </a:r>
+            <a:endParaRPr lang="en-US" dirty="0" smtClean="0"/>
+          </a:p>
+          <a:p>
+            <a:pPr lvl="1"/>
+            <a:r>
+              <a:rPr lang="en-US" dirty="0" smtClean="0"/>
+              <a:t>Haskell (atomic)</a:t>
+            </a:r>
+          </a:p>
+          <a:p>
+            <a:pPr lvl="1"/>
+            <a:endParaRPr lang="en-US" dirty="0" smtClean="0"/>
+          </a:p>
+          <a:p>
+            <a:r>
+              <a:rPr lang="en-US" dirty="0"/>
+              <a:t>Some reasonable defaults</a:t>
+            </a:r>
+          </a:p>
+          <a:p>
+            <a:pPr lvl="1"/>
+            <a:r>
+              <a:rPr lang="en-US" dirty="0"/>
+              <a:t>Extern methods </a:t>
+            </a:r>
+            <a:r>
+              <a:rPr lang="en-US" dirty="0" smtClean="0"/>
+              <a:t>can use @atomic </a:t>
+            </a:r>
+            <a:r>
+              <a:rPr lang="en-US" dirty="0"/>
+              <a:t>instead of rewriting method calls.</a:t>
+            </a:r>
+          </a:p>
+          <a:p>
+            <a:pPr lvl="1"/>
+            <a:r>
+              <a:rPr lang="en-US" dirty="0"/>
+              <a:t>Action calls can be atomic by default instead of rewriting action calls.</a:t>
+            </a:r>
+          </a:p>
+          <a:p>
+            <a:pPr lvl="1"/>
+            <a:r>
+              <a:rPr lang="en-US" dirty="0" smtClean="0"/>
+              <a:t>Expressions/assignments in </a:t>
+            </a:r>
+            <a:r>
+              <a:rPr lang="en-US" dirty="0"/>
+              <a:t>the language can be atomic by default</a:t>
+            </a:r>
+            <a:r>
+              <a:rPr lang="en-US" dirty="0" smtClean="0"/>
+              <a:t>?</a:t>
+            </a:r>
             <a:endParaRPr lang="en-US" dirty="0"/>
           </a:p>
         </p:txBody>
@@ -4276,13 +7002,376 @@
     </p:spTree>
     <p:extLst>
       <p:ext uri="{BB962C8B-B14F-4D97-AF65-F5344CB8AC3E}">
-        <p14:creationId xmlns:p14="http://schemas.microsoft.com/office/powerpoint/2010/main" val="99975364"/>
+        <p14:creationId xmlns:p14="http://schemas.microsoft.com/office/powerpoint/2010/main" val="1526511764"/>
       </p:ext>
     </p:extLst>
   </p:cSld>
   <p:clrMapOvr>
     <a:masterClrMapping/>
   </p:clrMapOvr>
+  <p:timing>
+    <p:tnLst>
+      <p:par>
+        <p:cTn id="1" dur="indefinite" restart="never" nodeType="tmRoot">
+          <p:childTnLst>
+            <p:seq concurrent="1" nextAc="seek">
+              <p:cTn id="2" dur="indefinite" nodeType="mainSeq">
+                <p:childTnLst>
+                  <p:par>
+                    <p:cTn id="3" fill="hold">
+                      <p:stCondLst>
+                        <p:cond delay="indefinite"/>
+                      </p:stCondLst>
+                      <p:childTnLst>
+                        <p:par>
+                          <p:cTn id="4" fill="hold">
+                            <p:stCondLst>
+                              <p:cond delay="0"/>
+                            </p:stCondLst>
+                            <p:childTnLst>
+                              <p:par>
+                                <p:cTn id="5" presetID="1" presetClass="entr" presetSubtype="0" fill="hold" nodeType="clickEffect">
+                                  <p:stCondLst>
+                                    <p:cond delay="0"/>
+                                  </p:stCondLst>
+                                  <p:childTnLst>
+                                    <p:set>
+                                      <p:cBhvr>
+                                        <p:cTn id="6" dur="1" fill="hold">
+                                          <p:stCondLst>
+                                            <p:cond delay="0"/>
+                                          </p:stCondLst>
+                                        </p:cTn>
+                                        <p:tgtEl>
+                                          <p:spTgt spid="4">
+                                            <p:txEl>
+                                              <p:pRg st="0" end="0"/>
+                                            </p:txEl>
+                                          </p:spTgt>
+                                        </p:tgtEl>
+                                        <p:attrNameLst>
+                                          <p:attrName>style.visibility</p:attrName>
+                                        </p:attrNameLst>
+                                      </p:cBhvr>
+                                      <p:to>
+                                        <p:strVal val="visible"/>
+                                      </p:to>
+                                    </p:set>
+                                  </p:childTnLst>
+                                </p:cTn>
+                              </p:par>
+                              <p:par>
+                                <p:cTn id="7" presetID="1" presetClass="entr" presetSubtype="0" fill="hold" nodeType="withEffect">
+                                  <p:stCondLst>
+                                    <p:cond delay="0"/>
+                                  </p:stCondLst>
+                                  <p:childTnLst>
+                                    <p:set>
+                                      <p:cBhvr>
+                                        <p:cTn id="8" dur="1" fill="hold">
+                                          <p:stCondLst>
+                                            <p:cond delay="0"/>
+                                          </p:stCondLst>
+                                        </p:cTn>
+                                        <p:tgtEl>
+                                          <p:spTgt spid="4">
+                                            <p:txEl>
+                                              <p:pRg st="1" end="1"/>
+                                            </p:txEl>
+                                          </p:spTgt>
+                                        </p:tgtEl>
+                                        <p:attrNameLst>
+                                          <p:attrName>style.visibility</p:attrName>
+                                        </p:attrNameLst>
+                                      </p:cBhvr>
+                                      <p:to>
+                                        <p:strVal val="visible"/>
+                                      </p:to>
+                                    </p:set>
+                                  </p:childTnLst>
+                                </p:cTn>
+                              </p:par>
+                            </p:childTnLst>
+                          </p:cTn>
+                        </p:par>
+                      </p:childTnLst>
+                    </p:cTn>
+                  </p:par>
+                  <p:par>
+                    <p:cTn id="9" fill="hold">
+                      <p:stCondLst>
+                        <p:cond delay="indefinite"/>
+                      </p:stCondLst>
+                      <p:childTnLst>
+                        <p:par>
+                          <p:cTn id="10" fill="hold">
+                            <p:stCondLst>
+                              <p:cond delay="0"/>
+                            </p:stCondLst>
+                            <p:childTnLst>
+                              <p:par>
+                                <p:cTn id="11" presetID="1" presetClass="entr" presetSubtype="0" fill="hold" nodeType="clickEffect">
+                                  <p:stCondLst>
+                                    <p:cond delay="0"/>
+                                  </p:stCondLst>
+                                  <p:childTnLst>
+                                    <p:set>
+                                      <p:cBhvr>
+                                        <p:cTn id="12" dur="1" fill="hold">
+                                          <p:stCondLst>
+                                            <p:cond delay="0"/>
+                                          </p:stCondLst>
+                                        </p:cTn>
+                                        <p:tgtEl>
+                                          <p:spTgt spid="4">
+                                            <p:txEl>
+                                              <p:pRg st="3" end="3"/>
+                                            </p:txEl>
+                                          </p:spTgt>
+                                        </p:tgtEl>
+                                        <p:attrNameLst>
+                                          <p:attrName>style.visibility</p:attrName>
+                                        </p:attrNameLst>
+                                      </p:cBhvr>
+                                      <p:to>
+                                        <p:strVal val="visible"/>
+                                      </p:to>
+                                    </p:set>
+                                  </p:childTnLst>
+                                </p:cTn>
+                              </p:par>
+                              <p:par>
+                                <p:cTn id="13" presetID="1" presetClass="entr" presetSubtype="0" fill="hold" nodeType="withEffect">
+                                  <p:stCondLst>
+                                    <p:cond delay="0"/>
+                                  </p:stCondLst>
+                                  <p:childTnLst>
+                                    <p:set>
+                                      <p:cBhvr>
+                                        <p:cTn id="14" dur="1" fill="hold">
+                                          <p:stCondLst>
+                                            <p:cond delay="0"/>
+                                          </p:stCondLst>
+                                        </p:cTn>
+                                        <p:tgtEl>
+                                          <p:spTgt spid="4">
+                                            <p:txEl>
+                                              <p:pRg st="4" end="4"/>
+                                            </p:txEl>
+                                          </p:spTgt>
+                                        </p:tgtEl>
+                                        <p:attrNameLst>
+                                          <p:attrName>style.visibility</p:attrName>
+                                        </p:attrNameLst>
+                                      </p:cBhvr>
+                                      <p:to>
+                                        <p:strVal val="visible"/>
+                                      </p:to>
+                                    </p:set>
+                                  </p:childTnLst>
+                                </p:cTn>
+                              </p:par>
+                              <p:par>
+                                <p:cTn id="15" presetID="1" presetClass="entr" presetSubtype="0" fill="hold" nodeType="withEffect">
+                                  <p:stCondLst>
+                                    <p:cond delay="0"/>
+                                  </p:stCondLst>
+                                  <p:childTnLst>
+                                    <p:set>
+                                      <p:cBhvr>
+                                        <p:cTn id="16" dur="1" fill="hold">
+                                          <p:stCondLst>
+                                            <p:cond delay="0"/>
+                                          </p:stCondLst>
+                                        </p:cTn>
+                                        <p:tgtEl>
+                                          <p:spTgt spid="4">
+                                            <p:txEl>
+                                              <p:pRg st="5" end="5"/>
+                                            </p:txEl>
+                                          </p:spTgt>
+                                        </p:tgtEl>
+                                        <p:attrNameLst>
+                                          <p:attrName>style.visibility</p:attrName>
+                                        </p:attrNameLst>
+                                      </p:cBhvr>
+                                      <p:to>
+                                        <p:strVal val="visible"/>
+                                      </p:to>
+                                    </p:set>
+                                  </p:childTnLst>
+                                </p:cTn>
+                              </p:par>
+                            </p:childTnLst>
+                          </p:cTn>
+                        </p:par>
+                      </p:childTnLst>
+                    </p:cTn>
+                  </p:par>
+                  <p:par>
+                    <p:cTn id="17" fill="hold">
+                      <p:stCondLst>
+                        <p:cond delay="indefinite"/>
+                      </p:stCondLst>
+                      <p:childTnLst>
+                        <p:par>
+                          <p:cTn id="18" fill="hold">
+                            <p:stCondLst>
+                              <p:cond delay="0"/>
+                            </p:stCondLst>
+                            <p:childTnLst>
+                              <p:par>
+                                <p:cTn id="19" presetID="1" presetClass="entr" presetSubtype="0" fill="hold" nodeType="clickEffect">
+                                  <p:stCondLst>
+                                    <p:cond delay="0"/>
+                                  </p:stCondLst>
+                                  <p:childTnLst>
+                                    <p:set>
+                                      <p:cBhvr>
+                                        <p:cTn id="20" dur="1" fill="hold">
+                                          <p:stCondLst>
+                                            <p:cond delay="0"/>
+                                          </p:stCondLst>
+                                        </p:cTn>
+                                        <p:tgtEl>
+                                          <p:spTgt spid="4">
+                                            <p:txEl>
+                                              <p:pRg st="7" end="7"/>
+                                            </p:txEl>
+                                          </p:spTgt>
+                                        </p:tgtEl>
+                                        <p:attrNameLst>
+                                          <p:attrName>style.visibility</p:attrName>
+                                        </p:attrNameLst>
+                                      </p:cBhvr>
+                                      <p:to>
+                                        <p:strVal val="visible"/>
+                                      </p:to>
+                                    </p:set>
+                                  </p:childTnLst>
+                                </p:cTn>
+                              </p:par>
+                              <p:par>
+                                <p:cTn id="21" presetID="1" presetClass="entr" presetSubtype="0" fill="hold" nodeType="withEffect">
+                                  <p:stCondLst>
+                                    <p:cond delay="0"/>
+                                  </p:stCondLst>
+                                  <p:childTnLst>
+                                    <p:set>
+                                      <p:cBhvr>
+                                        <p:cTn id="22" dur="1" fill="hold">
+                                          <p:stCondLst>
+                                            <p:cond delay="0"/>
+                                          </p:stCondLst>
+                                        </p:cTn>
+                                        <p:tgtEl>
+                                          <p:spTgt spid="4">
+                                            <p:txEl>
+                                              <p:pRg st="8" end="8"/>
+                                            </p:txEl>
+                                          </p:spTgt>
+                                        </p:tgtEl>
+                                        <p:attrNameLst>
+                                          <p:attrName>style.visibility</p:attrName>
+                                        </p:attrNameLst>
+                                      </p:cBhvr>
+                                      <p:to>
+                                        <p:strVal val="visible"/>
+                                      </p:to>
+                                    </p:set>
+                                  </p:childTnLst>
+                                </p:cTn>
+                              </p:par>
+                              <p:par>
+                                <p:cTn id="23" presetID="1" presetClass="entr" presetSubtype="0" fill="hold" nodeType="withEffect">
+                                  <p:stCondLst>
+                                    <p:cond delay="0"/>
+                                  </p:stCondLst>
+                                  <p:childTnLst>
+                                    <p:set>
+                                      <p:cBhvr>
+                                        <p:cTn id="24" dur="1" fill="hold">
+                                          <p:stCondLst>
+                                            <p:cond delay="0"/>
+                                          </p:stCondLst>
+                                        </p:cTn>
+                                        <p:tgtEl>
+                                          <p:spTgt spid="4">
+                                            <p:txEl>
+                                              <p:pRg st="9" end="9"/>
+                                            </p:txEl>
+                                          </p:spTgt>
+                                        </p:tgtEl>
+                                        <p:attrNameLst>
+                                          <p:attrName>style.visibility</p:attrName>
+                                        </p:attrNameLst>
+                                      </p:cBhvr>
+                                      <p:to>
+                                        <p:strVal val="visible"/>
+                                      </p:to>
+                                    </p:set>
+                                  </p:childTnLst>
+                                </p:cTn>
+                              </p:par>
+                              <p:par>
+                                <p:cTn id="25" presetID="1" presetClass="entr" presetSubtype="0" fill="hold" nodeType="withEffect">
+                                  <p:stCondLst>
+                                    <p:cond delay="0"/>
+                                  </p:stCondLst>
+                                  <p:childTnLst>
+                                    <p:set>
+                                      <p:cBhvr>
+                                        <p:cTn id="26" dur="1" fill="hold">
+                                          <p:stCondLst>
+                                            <p:cond delay="0"/>
+                                          </p:stCondLst>
+                                        </p:cTn>
+                                        <p:tgtEl>
+                                          <p:spTgt spid="4">
+                                            <p:txEl>
+                                              <p:pRg st="10" end="10"/>
+                                            </p:txEl>
+                                          </p:spTgt>
+                                        </p:tgtEl>
+                                        <p:attrNameLst>
+                                          <p:attrName>style.visibility</p:attrName>
+                                        </p:attrNameLst>
+                                      </p:cBhvr>
+                                      <p:to>
+                                        <p:strVal val="visible"/>
+                                      </p:to>
+                                    </p:set>
+                                  </p:childTnLst>
+                                </p:cTn>
+                              </p:par>
+                            </p:childTnLst>
+                          </p:cTn>
+                        </p:par>
+                      </p:childTnLst>
+                    </p:cTn>
+                  </p:par>
+                </p:childTnLst>
+              </p:cTn>
+              <p:prevCondLst>
+                <p:cond evt="onPrev" delay="0">
+                  <p:tgtEl>
+                    <p:sldTgt/>
+                  </p:tgtEl>
+                </p:cond>
+              </p:prevCondLst>
+              <p:nextCondLst>
+                <p:cond evt="onNext" delay="0">
+                  <p:tgtEl>
+                    <p:sldTgt/>
+                  </p:tgtEl>
+                </p:cond>
+              </p:nextCondLst>
+            </p:seq>
+          </p:childTnLst>
+        </p:cTn>
+      </p:par>
+    </p:tnLst>
+  </p:timing>
 </p:sld>
 </file>
 

</xml_diff>